<commit_message>
Updated the regression lecture Added the python demos
</commit_message>
<xml_diff>
--- a/lectures/Lect02_SimpRegression.pptx
+++ b/lectures/Lect02_SimpRegression.pptx
@@ -5,12 +5,12 @@
     <p:sldMasterId id="2147483648" r:id="rId1"/>
   </p:sldMasterIdLst>
   <p:notesMasterIdLst>
-    <p:notesMasterId r:id="rId37"/>
+    <p:notesMasterId r:id="rId39"/>
   </p:notesMasterIdLst>
   <p:sldIdLst>
     <p:sldId id="258" r:id="rId2"/>
     <p:sldId id="282" r:id="rId3"/>
-    <p:sldId id="293" r:id="rId4"/>
+    <p:sldId id="302" r:id="rId4"/>
     <p:sldId id="264" r:id="rId5"/>
     <p:sldId id="288" r:id="rId6"/>
     <p:sldId id="263" r:id="rId7"/>
@@ -19,30 +19,32 @@
     <p:sldId id="266" r:id="rId10"/>
     <p:sldId id="267" r:id="rId11"/>
     <p:sldId id="268" r:id="rId12"/>
-    <p:sldId id="292" r:id="rId13"/>
+    <p:sldId id="301" r:id="rId13"/>
     <p:sldId id="270" r:id="rId14"/>
     <p:sldId id="271" r:id="rId15"/>
     <p:sldId id="283" r:id="rId16"/>
-    <p:sldId id="273" r:id="rId17"/>
+    <p:sldId id="300" r:id="rId17"/>
     <p:sldId id="272" r:id="rId18"/>
     <p:sldId id="261" r:id="rId19"/>
     <p:sldId id="286" r:id="rId20"/>
     <p:sldId id="287" r:id="rId21"/>
-    <p:sldId id="276" r:id="rId22"/>
-    <p:sldId id="275" r:id="rId23"/>
+    <p:sldId id="275" r:id="rId22"/>
+    <p:sldId id="276" r:id="rId23"/>
     <p:sldId id="289" r:id="rId24"/>
     <p:sldId id="285" r:id="rId25"/>
     <p:sldId id="277" r:id="rId26"/>
-    <p:sldId id="284" r:id="rId27"/>
-    <p:sldId id="295" r:id="rId28"/>
-    <p:sldId id="262" r:id="rId29"/>
-    <p:sldId id="278" r:id="rId30"/>
-    <p:sldId id="290" r:id="rId31"/>
-    <p:sldId id="291" r:id="rId32"/>
-    <p:sldId id="280" r:id="rId33"/>
-    <p:sldId id="281" r:id="rId34"/>
-    <p:sldId id="274" r:id="rId35"/>
-    <p:sldId id="294" r:id="rId36"/>
+    <p:sldId id="297" r:id="rId27"/>
+    <p:sldId id="284" r:id="rId28"/>
+    <p:sldId id="295" r:id="rId29"/>
+    <p:sldId id="298" r:id="rId30"/>
+    <p:sldId id="262" r:id="rId31"/>
+    <p:sldId id="278" r:id="rId32"/>
+    <p:sldId id="290" r:id="rId33"/>
+    <p:sldId id="299" r:id="rId34"/>
+    <p:sldId id="280" r:id="rId35"/>
+    <p:sldId id="281" r:id="rId36"/>
+    <p:sldId id="274" r:id="rId37"/>
+    <p:sldId id="294" r:id="rId38"/>
   </p:sldIdLst>
   <p:sldSz cx="12192000" cy="6858000"/>
   <p:notesSz cx="7315200" cy="9601200"/>
@@ -4356,26 +4358,26 @@
           <a:p>
             <a:r>
               <a:rPr lang="en-US" dirty="0"/>
-              <a:t>Try to find a mathematical to predict mpg from displacement</a:t>
-            </a:r>
-          </a:p>
-          <a:p>
+              <a:t>Try to find a mathematical to predict mpg from displacement, horsepower or acceleration</a:t>
+            </a:r>
+          </a:p>
+          <a:p>
+            <a:pPr lvl="1"/>
             <a:r>
               <a:rPr lang="en-US" dirty="0"/>
-              <a:t>Try to “fit” the model.  Find coefficients / parameters in the model. </a:t>
-            </a:r>
-          </a:p>
-          <a:p>
-            <a:pPr lvl="1"/>
+              <a:t>Make a reasonable / eyeball guess.  No need for program now.</a:t>
+            </a:r>
+          </a:p>
+          <a:p>
             <a:r>
               <a:rPr lang="en-US" dirty="0"/>
-              <a:t>Without using python, make a good guess at the parameters</a:t>
+              <a:t>What does your model predict when displacement = 200?</a:t>
             </a:r>
           </a:p>
           <a:p>
             <a:r>
               <a:rPr lang="en-US" dirty="0"/>
-              <a:t>Which variables (displacement, horsepower, acceleration) seem to predict mpg the best?</a:t>
+              <a:t>Is the prediction reasonable?  Can you improve your model?</a:t>
             </a:r>
           </a:p>
         </p:txBody>
@@ -4694,7 +4696,13 @@
           <a:p>
             <a:r>
               <a:rPr lang="en-US" dirty="0"/>
-              <a:t>Sample Mean and Variance; LS Fit Solution</a:t>
+              <a:t>Sample Mean and Variance</a:t>
+            </a:r>
+          </a:p>
+          <a:p>
+            <a:r>
+              <a:rPr lang="en-US" dirty="0"/>
+              <a:t>LS Fit Solution</a:t>
             </a:r>
           </a:p>
           <a:p>
@@ -4736,7 +4744,7 @@
         </p:nvSpPr>
         <p:spPr>
           <a:xfrm>
-            <a:off x="318749" y="1872608"/>
+            <a:off x="262104" y="1880359"/>
             <a:ext cx="938784" cy="484632"/>
           </a:xfrm>
           <a:prstGeom prst="rightArrow">
@@ -4777,7 +4785,7 @@
     </p:spTree>
     <p:extLst>
       <p:ext uri="{BB962C8B-B14F-4D97-AF65-F5344CB8AC3E}">
-        <p14:creationId xmlns:p14="http://schemas.microsoft.com/office/powerpoint/2010/main" val="2516477050"/>
+        <p14:creationId xmlns:p14="http://schemas.microsoft.com/office/powerpoint/2010/main" val="2614087899"/>
       </p:ext>
     </p:extLst>
   </p:cSld>
@@ -6793,7 +6801,13 @@
           <a:p>
             <a:r>
               <a:rPr lang="en-US" dirty="0"/>
-              <a:t>Sample Mean and Variance; LS Fit Solution</a:t>
+              <a:t>Sample Mean and Variance</a:t>
+            </a:r>
+          </a:p>
+          <a:p>
+            <a:r>
+              <a:rPr lang="en-US" dirty="0"/>
+              <a:t>LS Fit Solution</a:t>
             </a:r>
           </a:p>
           <a:p>
@@ -6835,7 +6849,7 @@
         </p:nvSpPr>
         <p:spPr>
           <a:xfrm>
-            <a:off x="396240" y="2353056"/>
+            <a:off x="287861" y="2408392"/>
             <a:ext cx="938784" cy="484632"/>
           </a:xfrm>
           <a:prstGeom prst="rightArrow">
@@ -6876,7 +6890,7 @@
     </p:spTree>
     <p:extLst>
       <p:ext uri="{BB962C8B-B14F-4D97-AF65-F5344CB8AC3E}">
-        <p14:creationId xmlns:p14="http://schemas.microsoft.com/office/powerpoint/2010/main" val="3706351502"/>
+        <p14:creationId xmlns:p14="http://schemas.microsoft.com/office/powerpoint/2010/main" val="172348312"/>
       </p:ext>
     </p:extLst>
   </p:cSld>
@@ -9187,7 +9201,31 @@
                       <a:rPr lang="en-US" b="0" i="1" smtClean="0">
                         <a:latin typeface="Cambria Math" panose="02040503050406030204" pitchFamily="18" charset="0"/>
                       </a:rPr>
-                      <m:t>=1,2,…,</m:t>
+                      <m:t>=</m:t>
+                    </m:r>
+                    <m:r>
+                      <a:rPr lang="en-US" b="0" i="1" smtClean="0">
+                        <a:latin typeface="Cambria Math" panose="02040503050406030204" pitchFamily="18" charset="0"/>
+                      </a:rPr>
+                      <m:t>1</m:t>
+                    </m:r>
+                    <m:r>
+                      <a:rPr lang="en-US" b="0" i="1" smtClean="0">
+                        <a:latin typeface="Cambria Math" panose="02040503050406030204" pitchFamily="18" charset="0"/>
+                      </a:rPr>
+                      <m:t>,</m:t>
+                    </m:r>
+                    <m:r>
+                      <a:rPr lang="en-US" b="0" i="1" smtClean="0">
+                        <a:latin typeface="Cambria Math" panose="02040503050406030204" pitchFamily="18" charset="0"/>
+                      </a:rPr>
+                      <m:t>2</m:t>
+                    </m:r>
+                    <m:r>
+                      <a:rPr lang="en-US" b="0" i="1" smtClean="0">
+                        <a:latin typeface="Cambria Math" panose="02040503050406030204" pitchFamily="18" charset="0"/>
+                      </a:rPr>
+                      <m:t>,…,</m:t>
                     </m:r>
                     <m:r>
                       <a:rPr lang="en-US" b="0" i="1" smtClean="0">
@@ -10270,7 +10308,13 @@
           <a:p>
             <a:r>
               <a:rPr lang="en-US" dirty="0"/>
-              <a:t>Sample Mean and Variance; LS Fit Solution</a:t>
+              <a:t>Sample Mean and Variance</a:t>
+            </a:r>
+          </a:p>
+          <a:p>
+            <a:r>
+              <a:rPr lang="en-US" dirty="0"/>
+              <a:t>LS Fit Solution</a:t>
             </a:r>
           </a:p>
           <a:p>
@@ -10390,331 +10434,6 @@
             <p:ph type="title"/>
           </p:nvPr>
         </p:nvSpPr>
-        <p:spPr>
-          <a:xfrm>
-            <a:off x="1097280" y="286603"/>
-            <a:ext cx="10058400" cy="1040211"/>
-          </a:xfrm>
-        </p:spPr>
-        <p:txBody>
-          <a:bodyPr>
-            <a:normAutofit fontScale="90000"/>
-          </a:bodyPr>
-          <a:lstStyle/>
-          <a:p>
-            <a:r>
-              <a:rPr lang="en-US" dirty="0"/>
-              <a:t>Visualizing Mean and SD on Scatter Plot</a:t>
-            </a:r>
-            <a:br>
-              <a:rPr lang="en-US" dirty="0"/>
-            </a:br>
-            <a:r>
-              <a:rPr lang="en-US" sz="4000" dirty="0"/>
-              <a:t>Question</a:t>
-            </a:r>
-          </a:p>
-        </p:txBody>
-      </p:sp>
-      <mc:AlternateContent xmlns:mc="http://schemas.openxmlformats.org/markup-compatibility/2006" xmlns:a14="http://schemas.microsoft.com/office/drawing/2010/main">
-        <mc:Choice Requires="a14">
-          <p:sp>
-            <p:nvSpPr>
-              <p:cNvPr id="3" name="Content Placeholder 2"/>
-              <p:cNvSpPr>
-                <a:spLocks noGrp="1"/>
-              </p:cNvSpPr>
-              <p:nvPr>
-                <p:ph idx="1"/>
-              </p:nvPr>
-            </p:nvSpPr>
-            <p:spPr>
-              <a:xfrm>
-                <a:off x="1097280" y="1539277"/>
-                <a:ext cx="10058400" cy="4329817"/>
-              </a:xfrm>
-            </p:spPr>
-            <p:txBody>
-              <a:bodyPr/>
-              <a:lstStyle/>
-              <a:p>
-                <a:pPr marL="0" indent="0">
-                  <a:buNone/>
-                </a:pPr>
-                <a:r>
-                  <a:rPr lang="en-US" dirty="0"/>
-                  <a:t>Using the picture only (no calculators), estimate the following (roughly):</a:t>
-                </a:r>
-              </a:p>
-              <a:p>
-                <a:endParaRPr lang="en-US" dirty="0"/>
-              </a:p>
-              <a:p>
-                <a:r>
-                  <a:rPr lang="en-US" dirty="0"/>
-                  <a:t>The sample mean mpg and horsepower: </a:t>
-                </a:r>
-                <a14:m>
-                  <m:oMath xmlns:m="http://schemas.openxmlformats.org/officeDocument/2006/math">
-                    <m:acc>
-                      <m:accPr>
-                        <m:chr m:val="̅"/>
-                        <m:ctrlPr>
-                          <a:rPr lang="en-US" i="1">
-                            <a:latin typeface="Cambria Math" panose="02040503050406030204" pitchFamily="18" charset="0"/>
-                          </a:rPr>
-                        </m:ctrlPr>
-                      </m:accPr>
-                      <m:e>
-                        <m:r>
-                          <a:rPr lang="en-US" i="1">
-                            <a:latin typeface="Cambria Math" panose="02040503050406030204" pitchFamily="18" charset="0"/>
-                          </a:rPr>
-                          <m:t>𝑥</m:t>
-                        </m:r>
-                      </m:e>
-                    </m:acc>
-                  </m:oMath>
-                </a14:m>
-                <a:r>
-                  <a:rPr lang="en-US" dirty="0"/>
-                  <a:t>, </a:t>
-                </a:r>
-                <a14:m>
-                  <m:oMath xmlns:m="http://schemas.openxmlformats.org/officeDocument/2006/math">
-                    <m:acc>
-                      <m:accPr>
-                        <m:chr m:val="̅"/>
-                        <m:ctrlPr>
-                          <a:rPr lang="en-US" i="1" smtClean="0">
-                            <a:latin typeface="Cambria Math" panose="02040503050406030204" pitchFamily="18" charset="0"/>
-                          </a:rPr>
-                        </m:ctrlPr>
-                      </m:accPr>
-                      <m:e>
-                        <m:r>
-                          <a:rPr lang="en-US" b="0" i="1" smtClean="0">
-                            <a:latin typeface="Cambria Math" panose="02040503050406030204" pitchFamily="18" charset="0"/>
-                          </a:rPr>
-                          <m:t>𝑦</m:t>
-                        </m:r>
-                      </m:e>
-                    </m:acc>
-                  </m:oMath>
-                </a14:m>
-                <a:endParaRPr lang="en-US" dirty="0"/>
-              </a:p>
-              <a:p>
-                <a:endParaRPr lang="en-US" dirty="0"/>
-              </a:p>
-              <a:p>
-                <a:r>
-                  <a:rPr lang="en-US" dirty="0"/>
-                  <a:t>The sample </a:t>
-                </a:r>
-                <a:r>
-                  <a:rPr lang="en-US" dirty="0" err="1"/>
-                  <a:t>std</a:t>
-                </a:r>
-                <a:r>
-                  <a:rPr lang="en-US" dirty="0"/>
-                  <a:t> deviations: </a:t>
-                </a:r>
-                <a14:m>
-                  <m:oMath xmlns:m="http://schemas.openxmlformats.org/officeDocument/2006/math">
-                    <m:sSub>
-                      <m:sSubPr>
-                        <m:ctrlPr>
-                          <a:rPr lang="en-US" b="0" i="1" smtClean="0">
-                            <a:latin typeface="Cambria Math" panose="02040503050406030204" pitchFamily="18" charset="0"/>
-                          </a:rPr>
-                        </m:ctrlPr>
-                      </m:sSubPr>
-                      <m:e>
-                        <m:r>
-                          <a:rPr lang="en-US" b="0" i="1" smtClean="0">
-                            <a:latin typeface="Cambria Math" panose="02040503050406030204" pitchFamily="18" charset="0"/>
-                          </a:rPr>
-                          <m:t>𝑠</m:t>
-                        </m:r>
-                      </m:e>
-                      <m:sub>
-                        <m:r>
-                          <a:rPr lang="en-US" b="0" i="1" smtClean="0">
-                            <a:latin typeface="Cambria Math" panose="02040503050406030204" pitchFamily="18" charset="0"/>
-                          </a:rPr>
-                          <m:t>𝑥</m:t>
-                        </m:r>
-                      </m:sub>
-                    </m:sSub>
-                    <m:r>
-                      <a:rPr lang="en-US" b="0" i="1" smtClean="0">
-                        <a:latin typeface="Cambria Math" panose="02040503050406030204" pitchFamily="18" charset="0"/>
-                      </a:rPr>
-                      <m:t>, </m:t>
-                    </m:r>
-                    <m:sSub>
-                      <m:sSubPr>
-                        <m:ctrlPr>
-                          <a:rPr lang="en-US" b="0" i="1" smtClean="0">
-                            <a:latin typeface="Cambria Math" panose="02040503050406030204" pitchFamily="18" charset="0"/>
-                          </a:rPr>
-                        </m:ctrlPr>
-                      </m:sSubPr>
-                      <m:e>
-                        <m:r>
-                          <a:rPr lang="en-US" b="0" i="1" smtClean="0">
-                            <a:latin typeface="Cambria Math" panose="02040503050406030204" pitchFamily="18" charset="0"/>
-                          </a:rPr>
-                          <m:t>𝑠</m:t>
-                        </m:r>
-                      </m:e>
-                      <m:sub>
-                        <m:r>
-                          <a:rPr lang="en-US" b="0" i="1" smtClean="0">
-                            <a:latin typeface="Cambria Math" panose="02040503050406030204" pitchFamily="18" charset="0"/>
-                          </a:rPr>
-                          <m:t>𝑦</m:t>
-                        </m:r>
-                      </m:sub>
-                    </m:sSub>
-                  </m:oMath>
-                </a14:m>
-                <a:endParaRPr lang="en-US" dirty="0"/>
-              </a:p>
-            </p:txBody>
-          </p:sp>
-        </mc:Choice>
-        <mc:Fallback xmlns="">
-          <p:sp>
-            <p:nvSpPr>
-              <p:cNvPr id="3" name="Content Placeholder 2"/>
-              <p:cNvSpPr>
-                <a:spLocks noGrp="1" noRot="1" noChangeAspect="1" noMove="1" noResize="1" noEditPoints="1" noAdjustHandles="1" noChangeArrowheads="1" noChangeShapeType="1" noTextEdit="1"/>
-              </p:cNvSpPr>
-              <p:nvPr>
-                <p:ph idx="1"/>
-              </p:nvPr>
-            </p:nvSpPr>
-            <p:spPr>
-              <a:xfrm>
-                <a:off x="1097280" y="1539277"/>
-                <a:ext cx="10058400" cy="4329817"/>
-              </a:xfrm>
-              <a:blipFill>
-                <a:blip r:embed="rId2"/>
-                <a:stretch>
-                  <a:fillRect l="-1515" t="-1549"/>
-                </a:stretch>
-              </a:blipFill>
-            </p:spPr>
-            <p:txBody>
-              <a:bodyPr/>
-              <a:lstStyle/>
-              <a:p>
-                <a:r>
-                  <a:rPr lang="en-US">
-                    <a:noFill/>
-                  </a:rPr>
-                  <a:t> </a:t>
-                </a:r>
-              </a:p>
-            </p:txBody>
-          </p:sp>
-        </mc:Fallback>
-      </mc:AlternateContent>
-      <p:sp>
-        <p:nvSpPr>
-          <p:cNvPr id="4" name="Slide Number Placeholder 3"/>
-          <p:cNvSpPr>
-            <a:spLocks noGrp="1"/>
-          </p:cNvSpPr>
-          <p:nvPr>
-            <p:ph type="sldNum" sz="quarter" idx="12"/>
-          </p:nvPr>
-        </p:nvSpPr>
-        <p:spPr>
-          <a:xfrm>
-            <a:off x="9346794" y="6314268"/>
-            <a:ext cx="1312025" cy="365125"/>
-          </a:xfrm>
-        </p:spPr>
-        <p:txBody>
-          <a:bodyPr/>
-          <a:lstStyle/>
-          <a:p>
-            <a:fld id="{629637A9-119A-49DA-BD12-AAC58B377D80}" type="slidenum">
-              <a:rPr lang="en-US" smtClean="0"/>
-              <a:t>21</a:t>
-            </a:fld>
-            <a:endParaRPr lang="en-US" dirty="0"/>
-          </a:p>
-        </p:txBody>
-      </p:sp>
-      <p:pic>
-        <p:nvPicPr>
-          <p:cNvPr id="5" name="Picture 4"/>
-          <p:cNvPicPr>
-            <a:picLocks noChangeAspect="1"/>
-          </p:cNvPicPr>
-          <p:nvPr/>
-        </p:nvPicPr>
-        <p:blipFill>
-          <a:blip r:embed="rId3"/>
-          <a:stretch>
-            <a:fillRect/>
-          </a:stretch>
-        </p:blipFill>
-        <p:spPr>
-          <a:xfrm>
-            <a:off x="7065010" y="2260307"/>
-            <a:ext cx="4563567" cy="2955506"/>
-          </a:xfrm>
-          <a:prstGeom prst="rect">
-            <a:avLst/>
-          </a:prstGeom>
-        </p:spPr>
-      </p:pic>
-    </p:spTree>
-    <p:extLst>
-      <p:ext uri="{BB962C8B-B14F-4D97-AF65-F5344CB8AC3E}">
-        <p14:creationId xmlns:p14="http://schemas.microsoft.com/office/powerpoint/2010/main" val="48048437"/>
-      </p:ext>
-    </p:extLst>
-  </p:cSld>
-  <p:clrMapOvr>
-    <a:masterClrMapping/>
-  </p:clrMapOvr>
-</p:sld>
-</file>
-
-<file path=ppt/slides/slide22.xml><?xml version="1.0" encoding="utf-8"?>
-<p:sld xmlns:a="http://schemas.openxmlformats.org/drawingml/2006/main" xmlns:r="http://schemas.openxmlformats.org/officeDocument/2006/relationships" xmlns:p="http://schemas.openxmlformats.org/presentationml/2006/main">
-  <p:cSld>
-    <p:spTree>
-      <p:nvGrpSpPr>
-        <p:cNvPr id="1" name=""/>
-        <p:cNvGrpSpPr/>
-        <p:nvPr/>
-      </p:nvGrpSpPr>
-      <p:grpSpPr>
-        <a:xfrm>
-          <a:off x="0" y="0"/>
-          <a:ext cx="0" cy="0"/>
-          <a:chOff x="0" y="0"/>
-          <a:chExt cx="0" cy="0"/>
-        </a:xfrm>
-      </p:grpSpPr>
-      <p:sp>
-        <p:nvSpPr>
-          <p:cNvPr id="2" name="Title 1"/>
-          <p:cNvSpPr>
-            <a:spLocks noGrp="1"/>
-          </p:cNvSpPr>
-          <p:nvPr>
-            <p:ph type="title"/>
-          </p:nvPr>
-        </p:nvSpPr>
         <p:spPr/>
         <p:txBody>
           <a:bodyPr/>
@@ -10727,8 +10446,8 @@
           </a:p>
         </p:txBody>
       </p:sp>
-      <mc:AlternateContent xmlns:mc="http://schemas.openxmlformats.org/markup-compatibility/2006" xmlns:a14="http://schemas.microsoft.com/office/drawing/2010/main">
-        <mc:Choice Requires="a14">
+      <mc:AlternateContent xmlns:mc="http://schemas.openxmlformats.org/markup-compatibility/2006">
+        <mc:Choice xmlns:a14="http://schemas.microsoft.com/office/drawing/2010/main" Requires="a14">
           <p:sp>
             <p:nvSpPr>
               <p:cNvPr id="3" name="Content Placeholder 2"/>
@@ -10746,11 +10465,123 @@
               </a:xfrm>
             </p:spPr>
             <p:txBody>
-              <a:bodyPr/>
+              <a:bodyPr>
+                <a:normAutofit fontScale="92500" lnSpcReduction="20000"/>
+              </a:bodyPr>
               <a:lstStyle/>
               <a:p>
                 <a:r>
                   <a:rPr lang="en-US" dirty="0"/>
+                  <a:t>Given data </a:t>
+                </a:r>
+                <a14:m>
+                  <m:oMath xmlns:m="http://schemas.openxmlformats.org/officeDocument/2006/math">
+                    <m:sSub>
+                      <m:sSubPr>
+                        <m:ctrlPr>
+                          <a:rPr lang="en-US" i="1">
+                            <a:latin typeface="Cambria Math" panose="02040503050406030204" pitchFamily="18" charset="0"/>
+                          </a:rPr>
+                        </m:ctrlPr>
+                      </m:sSubPr>
+                      <m:e>
+                        <m:r>
+                          <a:rPr lang="en-US" b="0" i="1" smtClean="0">
+                            <a:latin typeface="Cambria Math" panose="02040503050406030204" pitchFamily="18" charset="0"/>
+                          </a:rPr>
+                          <m:t>(</m:t>
+                        </m:r>
+                        <m:r>
+                          <a:rPr lang="en-US" i="1">
+                            <a:latin typeface="Cambria Math" panose="02040503050406030204" pitchFamily="18" charset="0"/>
+                          </a:rPr>
+                          <m:t>𝑥</m:t>
+                        </m:r>
+                      </m:e>
+                      <m:sub>
+                        <m:r>
+                          <a:rPr lang="en-US" i="1">
+                            <a:latin typeface="Cambria Math" panose="02040503050406030204" pitchFamily="18" charset="0"/>
+                          </a:rPr>
+                          <m:t>𝑖</m:t>
+                        </m:r>
+                      </m:sub>
+                    </m:sSub>
+                    <m:r>
+                      <a:rPr lang="en-US" b="0" i="1" smtClean="0">
+                        <a:latin typeface="Cambria Math" panose="02040503050406030204" pitchFamily="18" charset="0"/>
+                      </a:rPr>
+                      <m:t>,</m:t>
+                    </m:r>
+                    <m:sSub>
+                      <m:sSubPr>
+                        <m:ctrlPr>
+                          <a:rPr lang="en-US" b="0" i="1" smtClean="0">
+                            <a:latin typeface="Cambria Math" panose="02040503050406030204" pitchFamily="18" charset="0"/>
+                          </a:rPr>
+                        </m:ctrlPr>
+                      </m:sSubPr>
+                      <m:e>
+                        <m:r>
+                          <a:rPr lang="en-US" b="0" i="1" smtClean="0">
+                            <a:latin typeface="Cambria Math" panose="02040503050406030204" pitchFamily="18" charset="0"/>
+                          </a:rPr>
+                          <m:t>𝑦</m:t>
+                        </m:r>
+                      </m:e>
+                      <m:sub>
+                        <m:r>
+                          <a:rPr lang="en-US" b="0" i="1" smtClean="0">
+                            <a:latin typeface="Cambria Math" panose="02040503050406030204" pitchFamily="18" charset="0"/>
+                          </a:rPr>
+                          <m:t>𝑖</m:t>
+                        </m:r>
+                      </m:sub>
+                    </m:sSub>
+                    <m:r>
+                      <a:rPr lang="en-US" b="0" i="1" smtClean="0">
+                        <a:latin typeface="Cambria Math" panose="02040503050406030204" pitchFamily="18" charset="0"/>
+                      </a:rPr>
+                      <m:t>)</m:t>
+                    </m:r>
+                    <m:r>
+                      <a:rPr lang="en-US" i="1">
+                        <a:latin typeface="Cambria Math" panose="02040503050406030204" pitchFamily="18" charset="0"/>
+                      </a:rPr>
+                      <m:t>, </m:t>
+                    </m:r>
+                    <m:r>
+                      <a:rPr lang="en-US" i="1">
+                        <a:latin typeface="Cambria Math" panose="02040503050406030204" pitchFamily="18" charset="0"/>
+                      </a:rPr>
+                      <m:t>𝑖</m:t>
+                    </m:r>
+                    <m:r>
+                      <a:rPr lang="en-US" i="1">
+                        <a:latin typeface="Cambria Math" panose="02040503050406030204" pitchFamily="18" charset="0"/>
+                      </a:rPr>
+                      <m:t>=1,…,</m:t>
+                    </m:r>
+                    <m:r>
+                      <a:rPr lang="en-US" i="1">
+                        <a:latin typeface="Cambria Math" panose="02040503050406030204" pitchFamily="18" charset="0"/>
+                      </a:rPr>
+                      <m:t>𝑁</m:t>
+                    </m:r>
+                  </m:oMath>
+                </a14:m>
+                <a:endParaRPr lang="en-US" dirty="0"/>
+              </a:p>
+              <a:p>
+                <a:r>
+                  <a:rPr lang="en-US" dirty="0">
+                    <a:solidFill>
+                      <a:schemeClr val="accent1">
+                        <a:lumMod val="60000"/>
+                        <a:lumOff val="40000"/>
+                      </a:schemeClr>
+                    </a:solidFill>
+                  </a:rPr>
                   <a:t>Sample mean</a:t>
                 </a:r>
                 <a:br>
@@ -11003,6 +10834,9 @@
                   <a:rPr lang="en-US" dirty="0"/>
                   <a:t>Sample variances</a:t>
                 </a:r>
+                <a:br>
+                  <a:rPr lang="en-US" dirty="0"/>
+                </a:br>
                 <a:br>
                   <a:rPr lang="en-US" dirty="0"/>
                 </a:br>
@@ -11420,7 +11254,7 @@
                 <a:pPr lvl="1"/>
                 <a:r>
                   <a:rPr lang="en-US" dirty="0"/>
-                  <a:t>Creates an unbiased estimate.  More on this later.</a:t>
+                  <a:t>For technical reasons, above formulae are called the biased variances.  </a:t>
                 </a:r>
               </a:p>
               <a:p>
@@ -11512,7 +11346,7 @@
             </p:txBody>
           </p:sp>
         </mc:Choice>
-        <mc:Fallback xmlns="">
+        <mc:Fallback>
           <p:sp>
             <p:nvSpPr>
               <p:cNvPr id="3" name="Content Placeholder 2"/>
@@ -11531,7 +11365,7 @@
               <a:blipFill>
                 <a:blip r:embed="rId2"/>
                 <a:stretch>
-                  <a:fillRect l="-2216" t="-1549"/>
+                  <a:fillRect l="-2031" t="-13521" r="-1754"/>
                 </a:stretch>
               </a:blipFill>
             </p:spPr>
@@ -11567,7 +11401,7 @@
           <a:p>
             <a:fld id="{629637A9-119A-49DA-BD12-AAC58B377D80}" type="slidenum">
               <a:rPr lang="en-US" smtClean="0"/>
-              <a:t>22</a:t>
+              <a:t>21</a:t>
             </a:fld>
             <a:endParaRPr lang="en-US" dirty="0"/>
           </a:p>
@@ -11657,6 +11491,331 @@
     <p:extLst>
       <p:ext uri="{BB962C8B-B14F-4D97-AF65-F5344CB8AC3E}">
         <p14:creationId xmlns:p14="http://schemas.microsoft.com/office/powerpoint/2010/main" val="3500512773"/>
+      </p:ext>
+    </p:extLst>
+  </p:cSld>
+  <p:clrMapOvr>
+    <a:masterClrMapping/>
+  </p:clrMapOvr>
+</p:sld>
+</file>
+
+<file path=ppt/slides/slide22.xml><?xml version="1.0" encoding="utf-8"?>
+<p:sld xmlns:a="http://schemas.openxmlformats.org/drawingml/2006/main" xmlns:r="http://schemas.openxmlformats.org/officeDocument/2006/relationships" xmlns:p="http://schemas.openxmlformats.org/presentationml/2006/main">
+  <p:cSld>
+    <p:spTree>
+      <p:nvGrpSpPr>
+        <p:cNvPr id="1" name=""/>
+        <p:cNvGrpSpPr/>
+        <p:nvPr/>
+      </p:nvGrpSpPr>
+      <p:grpSpPr>
+        <a:xfrm>
+          <a:off x="0" y="0"/>
+          <a:ext cx="0" cy="0"/>
+          <a:chOff x="0" y="0"/>
+          <a:chExt cx="0" cy="0"/>
+        </a:xfrm>
+      </p:grpSpPr>
+      <p:sp>
+        <p:nvSpPr>
+          <p:cNvPr id="2" name="Title 1"/>
+          <p:cNvSpPr>
+            <a:spLocks noGrp="1"/>
+          </p:cNvSpPr>
+          <p:nvPr>
+            <p:ph type="title"/>
+          </p:nvPr>
+        </p:nvSpPr>
+        <p:spPr>
+          <a:xfrm>
+            <a:off x="1097280" y="286603"/>
+            <a:ext cx="10058400" cy="1040211"/>
+          </a:xfrm>
+        </p:spPr>
+        <p:txBody>
+          <a:bodyPr>
+            <a:normAutofit fontScale="90000"/>
+          </a:bodyPr>
+          <a:lstStyle/>
+          <a:p>
+            <a:r>
+              <a:rPr lang="en-US" dirty="0"/>
+              <a:t>Visualizing Mean and SD on Scatter Plot</a:t>
+            </a:r>
+            <a:br>
+              <a:rPr lang="en-US" dirty="0"/>
+            </a:br>
+            <a:r>
+              <a:rPr lang="en-US" sz="4000" dirty="0"/>
+              <a:t>Question</a:t>
+            </a:r>
+          </a:p>
+        </p:txBody>
+      </p:sp>
+      <mc:AlternateContent xmlns:mc="http://schemas.openxmlformats.org/markup-compatibility/2006" xmlns:a14="http://schemas.microsoft.com/office/drawing/2010/main">
+        <mc:Choice Requires="a14">
+          <p:sp>
+            <p:nvSpPr>
+              <p:cNvPr id="3" name="Content Placeholder 2"/>
+              <p:cNvSpPr>
+                <a:spLocks noGrp="1"/>
+              </p:cNvSpPr>
+              <p:nvPr>
+                <p:ph idx="1"/>
+              </p:nvPr>
+            </p:nvSpPr>
+            <p:spPr>
+              <a:xfrm>
+                <a:off x="1097280" y="1539277"/>
+                <a:ext cx="10058400" cy="4329817"/>
+              </a:xfrm>
+            </p:spPr>
+            <p:txBody>
+              <a:bodyPr/>
+              <a:lstStyle/>
+              <a:p>
+                <a:pPr marL="0" indent="0">
+                  <a:buNone/>
+                </a:pPr>
+                <a:r>
+                  <a:rPr lang="en-US" dirty="0"/>
+                  <a:t>Using the picture only (no calculators), estimate the following (roughly):</a:t>
+                </a:r>
+              </a:p>
+              <a:p>
+                <a:endParaRPr lang="en-US" dirty="0"/>
+              </a:p>
+              <a:p>
+                <a:r>
+                  <a:rPr lang="en-US" dirty="0"/>
+                  <a:t>The sample mean mpg and horsepower: </a:t>
+                </a:r>
+                <a14:m>
+                  <m:oMath xmlns:m="http://schemas.openxmlformats.org/officeDocument/2006/math">
+                    <m:acc>
+                      <m:accPr>
+                        <m:chr m:val="̅"/>
+                        <m:ctrlPr>
+                          <a:rPr lang="en-US" i="1">
+                            <a:latin typeface="Cambria Math" panose="02040503050406030204" pitchFamily="18" charset="0"/>
+                          </a:rPr>
+                        </m:ctrlPr>
+                      </m:accPr>
+                      <m:e>
+                        <m:r>
+                          <a:rPr lang="en-US" i="1">
+                            <a:latin typeface="Cambria Math" panose="02040503050406030204" pitchFamily="18" charset="0"/>
+                          </a:rPr>
+                          <m:t>𝑥</m:t>
+                        </m:r>
+                      </m:e>
+                    </m:acc>
+                  </m:oMath>
+                </a14:m>
+                <a:r>
+                  <a:rPr lang="en-US" dirty="0"/>
+                  <a:t>, </a:t>
+                </a:r>
+                <a14:m>
+                  <m:oMath xmlns:m="http://schemas.openxmlformats.org/officeDocument/2006/math">
+                    <m:acc>
+                      <m:accPr>
+                        <m:chr m:val="̅"/>
+                        <m:ctrlPr>
+                          <a:rPr lang="en-US" i="1" smtClean="0">
+                            <a:latin typeface="Cambria Math" panose="02040503050406030204" pitchFamily="18" charset="0"/>
+                          </a:rPr>
+                        </m:ctrlPr>
+                      </m:accPr>
+                      <m:e>
+                        <m:r>
+                          <a:rPr lang="en-US" b="0" i="1" smtClean="0">
+                            <a:latin typeface="Cambria Math" panose="02040503050406030204" pitchFamily="18" charset="0"/>
+                          </a:rPr>
+                          <m:t>𝑦</m:t>
+                        </m:r>
+                      </m:e>
+                    </m:acc>
+                  </m:oMath>
+                </a14:m>
+                <a:endParaRPr lang="en-US" dirty="0"/>
+              </a:p>
+              <a:p>
+                <a:endParaRPr lang="en-US" dirty="0"/>
+              </a:p>
+              <a:p>
+                <a:r>
+                  <a:rPr lang="en-US" dirty="0"/>
+                  <a:t>The sample </a:t>
+                </a:r>
+                <a:r>
+                  <a:rPr lang="en-US" dirty="0" err="1"/>
+                  <a:t>std</a:t>
+                </a:r>
+                <a:r>
+                  <a:rPr lang="en-US" dirty="0"/>
+                  <a:t> deviations: </a:t>
+                </a:r>
+                <a14:m>
+                  <m:oMath xmlns:m="http://schemas.openxmlformats.org/officeDocument/2006/math">
+                    <m:sSub>
+                      <m:sSubPr>
+                        <m:ctrlPr>
+                          <a:rPr lang="en-US" b="0" i="1" smtClean="0">
+                            <a:latin typeface="Cambria Math" panose="02040503050406030204" pitchFamily="18" charset="0"/>
+                          </a:rPr>
+                        </m:ctrlPr>
+                      </m:sSubPr>
+                      <m:e>
+                        <m:r>
+                          <a:rPr lang="en-US" b="0" i="1" smtClean="0">
+                            <a:latin typeface="Cambria Math" panose="02040503050406030204" pitchFamily="18" charset="0"/>
+                          </a:rPr>
+                          <m:t>𝑠</m:t>
+                        </m:r>
+                      </m:e>
+                      <m:sub>
+                        <m:r>
+                          <a:rPr lang="en-US" b="0" i="1" smtClean="0">
+                            <a:latin typeface="Cambria Math" panose="02040503050406030204" pitchFamily="18" charset="0"/>
+                          </a:rPr>
+                          <m:t>𝑥</m:t>
+                        </m:r>
+                      </m:sub>
+                    </m:sSub>
+                    <m:r>
+                      <a:rPr lang="en-US" b="0" i="1" smtClean="0">
+                        <a:latin typeface="Cambria Math" panose="02040503050406030204" pitchFamily="18" charset="0"/>
+                      </a:rPr>
+                      <m:t>, </m:t>
+                    </m:r>
+                    <m:sSub>
+                      <m:sSubPr>
+                        <m:ctrlPr>
+                          <a:rPr lang="en-US" b="0" i="1" smtClean="0">
+                            <a:latin typeface="Cambria Math" panose="02040503050406030204" pitchFamily="18" charset="0"/>
+                          </a:rPr>
+                        </m:ctrlPr>
+                      </m:sSubPr>
+                      <m:e>
+                        <m:r>
+                          <a:rPr lang="en-US" b="0" i="1" smtClean="0">
+                            <a:latin typeface="Cambria Math" panose="02040503050406030204" pitchFamily="18" charset="0"/>
+                          </a:rPr>
+                          <m:t>𝑠</m:t>
+                        </m:r>
+                      </m:e>
+                      <m:sub>
+                        <m:r>
+                          <a:rPr lang="en-US" b="0" i="1" smtClean="0">
+                            <a:latin typeface="Cambria Math" panose="02040503050406030204" pitchFamily="18" charset="0"/>
+                          </a:rPr>
+                          <m:t>𝑦</m:t>
+                        </m:r>
+                      </m:sub>
+                    </m:sSub>
+                  </m:oMath>
+                </a14:m>
+                <a:endParaRPr lang="en-US" dirty="0"/>
+              </a:p>
+            </p:txBody>
+          </p:sp>
+        </mc:Choice>
+        <mc:Fallback xmlns="">
+          <p:sp>
+            <p:nvSpPr>
+              <p:cNvPr id="3" name="Content Placeholder 2"/>
+              <p:cNvSpPr>
+                <a:spLocks noGrp="1" noRot="1" noChangeAspect="1" noMove="1" noResize="1" noEditPoints="1" noAdjustHandles="1" noChangeArrowheads="1" noChangeShapeType="1" noTextEdit="1"/>
+              </p:cNvSpPr>
+              <p:nvPr>
+                <p:ph idx="1"/>
+              </p:nvPr>
+            </p:nvSpPr>
+            <p:spPr>
+              <a:xfrm>
+                <a:off x="1097280" y="1539277"/>
+                <a:ext cx="10058400" cy="4329817"/>
+              </a:xfrm>
+              <a:blipFill>
+                <a:blip r:embed="rId2"/>
+                <a:stretch>
+                  <a:fillRect l="-1515" t="-1549"/>
+                </a:stretch>
+              </a:blipFill>
+            </p:spPr>
+            <p:txBody>
+              <a:bodyPr/>
+              <a:lstStyle/>
+              <a:p>
+                <a:r>
+                  <a:rPr lang="en-US">
+                    <a:noFill/>
+                  </a:rPr>
+                  <a:t> </a:t>
+                </a:r>
+              </a:p>
+            </p:txBody>
+          </p:sp>
+        </mc:Fallback>
+      </mc:AlternateContent>
+      <p:sp>
+        <p:nvSpPr>
+          <p:cNvPr id="4" name="Slide Number Placeholder 3"/>
+          <p:cNvSpPr>
+            <a:spLocks noGrp="1"/>
+          </p:cNvSpPr>
+          <p:nvPr>
+            <p:ph type="sldNum" sz="quarter" idx="12"/>
+          </p:nvPr>
+        </p:nvSpPr>
+        <p:spPr>
+          <a:xfrm>
+            <a:off x="9346794" y="6314268"/>
+            <a:ext cx="1312025" cy="365125"/>
+          </a:xfrm>
+        </p:spPr>
+        <p:txBody>
+          <a:bodyPr/>
+          <a:lstStyle/>
+          <a:p>
+            <a:fld id="{629637A9-119A-49DA-BD12-AAC58B377D80}" type="slidenum">
+              <a:rPr lang="en-US" smtClean="0"/>
+              <a:t>22</a:t>
+            </a:fld>
+            <a:endParaRPr lang="en-US" dirty="0"/>
+          </a:p>
+        </p:txBody>
+      </p:sp>
+      <p:pic>
+        <p:nvPicPr>
+          <p:cNvPr id="5" name="Picture 4"/>
+          <p:cNvPicPr>
+            <a:picLocks noChangeAspect="1"/>
+          </p:cNvPicPr>
+          <p:nvPr/>
+        </p:nvPicPr>
+        <p:blipFill>
+          <a:blip r:embed="rId3"/>
+          <a:stretch>
+            <a:fillRect/>
+          </a:stretch>
+        </p:blipFill>
+        <p:spPr>
+          <a:xfrm>
+            <a:off x="7065010" y="2260307"/>
+            <a:ext cx="4563567" cy="2955506"/>
+          </a:xfrm>
+          <a:prstGeom prst="rect">
+            <a:avLst/>
+          </a:prstGeom>
+        </p:spPr>
+      </p:pic>
+    </p:spTree>
+    <p:extLst>
+      <p:ext uri="{BB962C8B-B14F-4D97-AF65-F5344CB8AC3E}">
+        <p14:creationId xmlns:p14="http://schemas.microsoft.com/office/powerpoint/2010/main" val="1202781834"/>
       </p:ext>
     </p:extLst>
   </p:cSld>
@@ -14181,7 +14340,13 @@
       </p:grpSpPr>
       <p:sp>
         <p:nvSpPr>
-          <p:cNvPr id="2" name="Title 1"/>
+          <p:cNvPr id="2" name="Title 1">
+            <a:extLst>
+              <a:ext uri="{FF2B5EF4-FFF2-40B4-BE49-F238E27FC236}">
+                <a16:creationId xmlns:a16="http://schemas.microsoft.com/office/drawing/2014/main" id="{47C8577C-218C-481F-8234-7C8F878DC8C7}"/>
+              </a:ext>
+            </a:extLst>
+          </p:cNvPr>
           <p:cNvSpPr>
             <a:spLocks noGrp="1"/>
           </p:cNvSpPr>
@@ -14196,16 +14361,22 @@
           <a:p>
             <a:r>
               <a:rPr lang="en-US" dirty="0"/>
-              <a:t>Alternate Equation for Variance</a:t>
+              <a:t>Statistics</a:t>
             </a:r>
           </a:p>
         </p:txBody>
       </p:sp>
-      <mc:AlternateContent xmlns:mc="http://schemas.openxmlformats.org/markup-compatibility/2006" xmlns:a14="http://schemas.microsoft.com/office/drawing/2010/main">
-        <mc:Choice Requires="a14">
+      <mc:AlternateContent xmlns:mc="http://schemas.openxmlformats.org/markup-compatibility/2006">
+        <mc:Choice xmlns:a14="http://schemas.microsoft.com/office/drawing/2010/main" Requires="a14">
           <p:sp>
             <p:nvSpPr>
-              <p:cNvPr id="3" name="Content Placeholder 2"/>
+              <p:cNvPr id="3" name="Content Placeholder 2">
+                <a:extLst>
+                  <a:ext uri="{FF2B5EF4-FFF2-40B4-BE49-F238E27FC236}">
+                    <a16:creationId xmlns:a16="http://schemas.microsoft.com/office/drawing/2014/main" id="{2C2CB76B-6912-4537-BD72-A8A5AC2E8DAB}"/>
+                  </a:ext>
+                </a:extLst>
+              </p:cNvPr>
               <p:cNvSpPr>
                 <a:spLocks noGrp="1"/>
               </p:cNvSpPr>
@@ -14220,48 +14391,169 @@
               <a:p>
                 <a:r>
                   <a:rPr lang="en-US" dirty="0"/>
-                  <a:t>Recall sample variance:  </a:t>
+                  <a:t>Often need to compute averages of other functions of data</a:t>
+                </a:r>
+              </a:p>
+              <a:p>
+                <a:r>
+                  <a:rPr lang="en-US" dirty="0">
+                    <a:solidFill>
+                      <a:schemeClr val="accent1">
+                        <a:lumMod val="60000"/>
+                        <a:lumOff val="40000"/>
+                      </a:schemeClr>
+                    </a:solidFill>
+                  </a:rPr>
+                  <a:t>Definition</a:t>
+                </a:r>
+                <a:r>
+                  <a:rPr lang="en-US" dirty="0"/>
+                  <a:t>:  The sample mean of a function </a:t>
                 </a:r>
                 <a14:m>
                   <m:oMath xmlns:m="http://schemas.openxmlformats.org/officeDocument/2006/math">
-                    <m:sSubSup>
-                      <m:sSubSupPr>
-                        <m:ctrlPr>
-                          <a:rPr lang="en-US" b="0" i="1" smtClean="0">
-                            <a:latin typeface="Cambria Math" panose="02040503050406030204" pitchFamily="18" charset="0"/>
-                          </a:rPr>
-                        </m:ctrlPr>
-                      </m:sSubSupPr>
-                      <m:e>
-                        <m:r>
-                          <a:rPr lang="en-US" b="0" i="1" smtClean="0">
-                            <a:latin typeface="Cambria Math" panose="02040503050406030204" pitchFamily="18" charset="0"/>
-                          </a:rPr>
-                          <m:t>𝑠</m:t>
-                        </m:r>
-                      </m:e>
-                      <m:sub>
-                        <m:r>
-                          <a:rPr lang="en-US" b="0" i="1" smtClean="0">
-                            <a:latin typeface="Cambria Math" panose="02040503050406030204" pitchFamily="18" charset="0"/>
-                          </a:rPr>
-                          <m:t>𝑥</m:t>
-                        </m:r>
-                      </m:sub>
-                      <m:sup>
-                        <m:r>
-                          <a:rPr lang="en-US" b="0" i="1" smtClean="0">
-                            <a:latin typeface="Cambria Math" panose="02040503050406030204" pitchFamily="18" charset="0"/>
-                          </a:rPr>
-                          <m:t>2</m:t>
-                        </m:r>
-                      </m:sup>
-                    </m:sSubSup>
                     <m:r>
                       <a:rPr lang="en-US" b="0" i="1" smtClean="0">
                         <a:latin typeface="Cambria Math" panose="02040503050406030204" pitchFamily="18" charset="0"/>
                       </a:rPr>
-                      <m:t>=</m:t>
+                      <m:t>𝑔</m:t>
+                    </m:r>
+                    <m:r>
+                      <a:rPr lang="en-US" b="0" i="1" smtClean="0">
+                        <a:latin typeface="Cambria Math" panose="02040503050406030204" pitchFamily="18" charset="0"/>
+                      </a:rPr>
+                      <m:t>(</m:t>
+                    </m:r>
+                    <m:r>
+                      <a:rPr lang="en-US" b="0" i="1" smtClean="0">
+                        <a:latin typeface="Cambria Math" panose="02040503050406030204" pitchFamily="18" charset="0"/>
+                      </a:rPr>
+                      <m:t>𝑥</m:t>
+                    </m:r>
+                    <m:r>
+                      <a:rPr lang="en-US" b="0" i="1" smtClean="0">
+                        <a:latin typeface="Cambria Math" panose="02040503050406030204" pitchFamily="18" charset="0"/>
+                      </a:rPr>
+                      <m:t>,</m:t>
+                    </m:r>
+                    <m:r>
+                      <a:rPr lang="en-US" b="0" i="1" smtClean="0">
+                        <a:latin typeface="Cambria Math" panose="02040503050406030204" pitchFamily="18" charset="0"/>
+                      </a:rPr>
+                      <m:t>𝑦</m:t>
+                    </m:r>
+                    <m:r>
+                      <a:rPr lang="en-US" b="0" i="1" smtClean="0">
+                        <a:latin typeface="Cambria Math" panose="02040503050406030204" pitchFamily="18" charset="0"/>
+                      </a:rPr>
+                      <m:t>)</m:t>
+                    </m:r>
+                  </m:oMath>
+                </a14:m>
+                <a:r>
+                  <a:rPr lang="en-US" dirty="0"/>
+                  <a:t> is:</a:t>
+                </a:r>
+                <a:br>
+                  <a:rPr lang="en-US" dirty="0"/>
+                </a:br>
+                <a:br>
+                  <a:rPr lang="en-US" dirty="0"/>
+                </a:br>
+                <a14:m>
+                  <m:oMath xmlns:m="http://schemas.openxmlformats.org/officeDocument/2006/math">
+                    <m:d>
+                      <m:dPr>
+                        <m:begChr m:val="⟨"/>
+                        <m:endChr m:val="⟩"/>
+                        <m:ctrlPr>
+                          <a:rPr lang="en-US" i="1" smtClean="0">
+                            <a:latin typeface="Cambria Math" panose="02040503050406030204" pitchFamily="18" charset="0"/>
+                          </a:rPr>
+                        </m:ctrlPr>
+                      </m:dPr>
+                      <m:e>
+                        <m:r>
+                          <a:rPr lang="en-US" b="0" i="1" smtClean="0">
+                            <a:latin typeface="Cambria Math" panose="02040503050406030204" pitchFamily="18" charset="0"/>
+                          </a:rPr>
+                          <m:t>𝑔</m:t>
+                        </m:r>
+                        <m:r>
+                          <a:rPr lang="en-US" b="0" i="1" smtClean="0">
+                            <a:latin typeface="Cambria Math" panose="02040503050406030204" pitchFamily="18" charset="0"/>
+                          </a:rPr>
+                          <m:t>(</m:t>
+                        </m:r>
+                        <m:sSub>
+                          <m:sSubPr>
+                            <m:ctrlPr>
+                              <a:rPr lang="en-US" b="0" i="1" smtClean="0">
+                                <a:latin typeface="Cambria Math" panose="02040503050406030204" pitchFamily="18" charset="0"/>
+                              </a:rPr>
+                            </m:ctrlPr>
+                          </m:sSubPr>
+                          <m:e>
+                            <m:r>
+                              <a:rPr lang="en-US" b="0" i="1" smtClean="0">
+                                <a:latin typeface="Cambria Math" panose="02040503050406030204" pitchFamily="18" charset="0"/>
+                              </a:rPr>
+                              <m:t>𝑥</m:t>
+                            </m:r>
+                          </m:e>
+                          <m:sub>
+                            <m:r>
+                              <a:rPr lang="en-US" b="0" i="1" smtClean="0">
+                                <a:latin typeface="Cambria Math" panose="02040503050406030204" pitchFamily="18" charset="0"/>
+                              </a:rPr>
+                              <m:t>𝑖</m:t>
+                            </m:r>
+                          </m:sub>
+                        </m:sSub>
+                        <m:r>
+                          <a:rPr lang="en-US" b="0" i="1" smtClean="0">
+                            <a:latin typeface="Cambria Math" panose="02040503050406030204" pitchFamily="18" charset="0"/>
+                          </a:rPr>
+                          <m:t>,</m:t>
+                        </m:r>
+                        <m:sSub>
+                          <m:sSubPr>
+                            <m:ctrlPr>
+                              <a:rPr lang="en-US" b="0" i="1" smtClean="0">
+                                <a:latin typeface="Cambria Math" panose="02040503050406030204" pitchFamily="18" charset="0"/>
+                              </a:rPr>
+                            </m:ctrlPr>
+                          </m:sSubPr>
+                          <m:e>
+                            <m:r>
+                              <a:rPr lang="en-US" b="0" i="1" smtClean="0">
+                                <a:latin typeface="Cambria Math" panose="02040503050406030204" pitchFamily="18" charset="0"/>
+                              </a:rPr>
+                              <m:t>𝑦</m:t>
+                            </m:r>
+                          </m:e>
+                          <m:sub>
+                            <m:r>
+                              <a:rPr lang="en-US" b="0" i="1" smtClean="0">
+                                <a:latin typeface="Cambria Math" panose="02040503050406030204" pitchFamily="18" charset="0"/>
+                              </a:rPr>
+                              <m:t>𝑖</m:t>
+                            </m:r>
+                          </m:sub>
+                        </m:sSub>
+                        <m:r>
+                          <a:rPr lang="en-US" b="0" i="1" smtClean="0">
+                            <a:latin typeface="Cambria Math" panose="02040503050406030204" pitchFamily="18" charset="0"/>
+                          </a:rPr>
+                          <m:t>)</m:t>
+                        </m:r>
+                      </m:e>
+                    </m:d>
+                    <m:r>
+                      <a:rPr lang="en-US" b="0" i="1" smtClean="0">
+                        <a:latin typeface="Cambria Math" panose="02040503050406030204" pitchFamily="18" charset="0"/>
+                      </a:rPr>
+                      <m:t>≔</m:t>
                     </m:r>
                     <m:f>
                       <m:fPr>
@@ -14291,16 +14583,420 @@
                     <m:nary>
                       <m:naryPr>
                         <m:chr m:val="∑"/>
-                        <m:subHide m:val="on"/>
-                        <m:supHide m:val="on"/>
                         <m:ctrlPr>
                           <a:rPr lang="en-US" b="0" i="1" smtClean="0">
                             <a:latin typeface="Cambria Math" panose="02040503050406030204" pitchFamily="18" charset="0"/>
                           </a:rPr>
                         </m:ctrlPr>
                       </m:naryPr>
-                      <m:sub/>
-                      <m:sup/>
+                      <m:sub>
+                        <m:r>
+                          <m:rPr>
+                            <m:brk m:alnAt="23"/>
+                          </m:rPr>
+                          <a:rPr lang="en-US" b="0" i="1" smtClean="0">
+                            <a:latin typeface="Cambria Math" panose="02040503050406030204" pitchFamily="18" charset="0"/>
+                          </a:rPr>
+                          <m:t>𝑖</m:t>
+                        </m:r>
+                        <m:r>
+                          <a:rPr lang="en-US" b="0" i="1" smtClean="0">
+                            <a:latin typeface="Cambria Math" panose="02040503050406030204" pitchFamily="18" charset="0"/>
+                          </a:rPr>
+                          <m:t>=1</m:t>
+                        </m:r>
+                      </m:sub>
+                      <m:sup>
+                        <m:r>
+                          <a:rPr lang="en-US" b="0" i="1" smtClean="0">
+                            <a:latin typeface="Cambria Math" panose="02040503050406030204" pitchFamily="18" charset="0"/>
+                          </a:rPr>
+                          <m:t>𝑁</m:t>
+                        </m:r>
+                      </m:sup>
+                      <m:e>
+                        <m:r>
+                          <a:rPr lang="en-US" b="0" i="1" smtClean="0">
+                            <a:latin typeface="Cambria Math" panose="02040503050406030204" pitchFamily="18" charset="0"/>
+                          </a:rPr>
+                          <m:t>𝑔</m:t>
+                        </m:r>
+                        <m:r>
+                          <a:rPr lang="en-US" b="0" i="1" smtClean="0">
+                            <a:latin typeface="Cambria Math" panose="02040503050406030204" pitchFamily="18" charset="0"/>
+                          </a:rPr>
+                          <m:t>(</m:t>
+                        </m:r>
+                        <m:sSub>
+                          <m:sSubPr>
+                            <m:ctrlPr>
+                              <a:rPr lang="en-US" b="0" i="1" smtClean="0">
+                                <a:latin typeface="Cambria Math" panose="02040503050406030204" pitchFamily="18" charset="0"/>
+                              </a:rPr>
+                            </m:ctrlPr>
+                          </m:sSubPr>
+                          <m:e>
+                            <m:r>
+                              <a:rPr lang="en-US" b="0" i="1" smtClean="0">
+                                <a:latin typeface="Cambria Math" panose="02040503050406030204" pitchFamily="18" charset="0"/>
+                              </a:rPr>
+                              <m:t>𝑥</m:t>
+                            </m:r>
+                          </m:e>
+                          <m:sub>
+                            <m:r>
+                              <a:rPr lang="en-US" b="0" i="1" smtClean="0">
+                                <a:latin typeface="Cambria Math" panose="02040503050406030204" pitchFamily="18" charset="0"/>
+                              </a:rPr>
+                              <m:t>𝑖</m:t>
+                            </m:r>
+                          </m:sub>
+                        </m:sSub>
+                        <m:r>
+                          <a:rPr lang="en-US" b="0" i="1" smtClean="0">
+                            <a:latin typeface="Cambria Math" panose="02040503050406030204" pitchFamily="18" charset="0"/>
+                          </a:rPr>
+                          <m:t>,</m:t>
+                        </m:r>
+                        <m:sSub>
+                          <m:sSubPr>
+                            <m:ctrlPr>
+                              <a:rPr lang="en-US" b="0" i="1" smtClean="0">
+                                <a:latin typeface="Cambria Math" panose="02040503050406030204" pitchFamily="18" charset="0"/>
+                              </a:rPr>
+                            </m:ctrlPr>
+                          </m:sSubPr>
+                          <m:e>
+                            <m:r>
+                              <a:rPr lang="en-US" b="0" i="1" smtClean="0">
+                                <a:latin typeface="Cambria Math" panose="02040503050406030204" pitchFamily="18" charset="0"/>
+                              </a:rPr>
+                              <m:t>𝑦</m:t>
+                            </m:r>
+                          </m:e>
+                          <m:sub>
+                            <m:r>
+                              <a:rPr lang="en-US" b="0" i="1" smtClean="0">
+                                <a:latin typeface="Cambria Math" panose="02040503050406030204" pitchFamily="18" charset="0"/>
+                              </a:rPr>
+                              <m:t>𝑖</m:t>
+                            </m:r>
+                          </m:sub>
+                        </m:sSub>
+                        <m:r>
+                          <a:rPr lang="en-US" b="0" i="1" smtClean="0">
+                            <a:latin typeface="Cambria Math" panose="02040503050406030204" pitchFamily="18" charset="0"/>
+                          </a:rPr>
+                          <m:t>)</m:t>
+                        </m:r>
+                      </m:e>
+                    </m:nary>
+                  </m:oMath>
+                </a14:m>
+                <a:endParaRPr lang="en-US" dirty="0"/>
+              </a:p>
+              <a:p>
+                <a:pPr lvl="1"/>
+                <a:r>
+                  <a:rPr lang="en-US" dirty="0"/>
+                  <a:t>Represents the average of </a:t>
+                </a:r>
+                <a14:m>
+                  <m:oMath xmlns:m="http://schemas.openxmlformats.org/officeDocument/2006/math">
+                    <m:r>
+                      <a:rPr lang="en-US" i="1">
+                        <a:latin typeface="Cambria Math" panose="02040503050406030204" pitchFamily="18" charset="0"/>
+                      </a:rPr>
+                      <m:t>𝑔</m:t>
+                    </m:r>
+                    <m:r>
+                      <a:rPr lang="en-US" i="1">
+                        <a:latin typeface="Cambria Math" panose="02040503050406030204" pitchFamily="18" charset="0"/>
+                      </a:rPr>
+                      <m:t>(</m:t>
+                    </m:r>
+                    <m:r>
+                      <a:rPr lang="en-US" i="1">
+                        <a:latin typeface="Cambria Math" panose="02040503050406030204" pitchFamily="18" charset="0"/>
+                      </a:rPr>
+                      <m:t>𝑥</m:t>
+                    </m:r>
+                    <m:r>
+                      <a:rPr lang="en-US" b="0" i="1" smtClean="0">
+                        <a:latin typeface="Cambria Math" panose="02040503050406030204" pitchFamily="18" charset="0"/>
+                      </a:rPr>
+                      <m:t>,</m:t>
+                    </m:r>
+                    <m:r>
+                      <a:rPr lang="en-US" b="0" i="1" smtClean="0">
+                        <a:latin typeface="Cambria Math" panose="02040503050406030204" pitchFamily="18" charset="0"/>
+                      </a:rPr>
+                      <m:t>𝑦</m:t>
+                    </m:r>
+                    <m:r>
+                      <a:rPr lang="en-US" i="1">
+                        <a:latin typeface="Cambria Math" panose="02040503050406030204" pitchFamily="18" charset="0"/>
+                      </a:rPr>
+                      <m:t>)</m:t>
+                    </m:r>
+                  </m:oMath>
+                </a14:m>
+                <a:r>
+                  <a:rPr lang="en-US" dirty="0"/>
+                  <a:t> on the data </a:t>
+                </a:r>
+              </a:p>
+              <a:p>
+                <a:pPr lvl="1"/>
+                <a:r>
+                  <a:rPr lang="en-US" dirty="0"/>
+                  <a:t>Function </a:t>
+                </a:r>
+                <a14:m>
+                  <m:oMath xmlns:m="http://schemas.openxmlformats.org/officeDocument/2006/math">
+                    <m:r>
+                      <a:rPr lang="en-US" i="1">
+                        <a:latin typeface="Cambria Math" panose="02040503050406030204" pitchFamily="18" charset="0"/>
+                      </a:rPr>
+                      <m:t>𝑔</m:t>
+                    </m:r>
+                    <m:r>
+                      <a:rPr lang="en-US" i="1">
+                        <a:latin typeface="Cambria Math" panose="02040503050406030204" pitchFamily="18" charset="0"/>
+                      </a:rPr>
+                      <m:t>(</m:t>
+                    </m:r>
+                    <m:r>
+                      <a:rPr lang="en-US" i="1">
+                        <a:latin typeface="Cambria Math" panose="02040503050406030204" pitchFamily="18" charset="0"/>
+                      </a:rPr>
+                      <m:t>𝑥</m:t>
+                    </m:r>
+                    <m:r>
+                      <a:rPr lang="en-US" i="1">
+                        <a:latin typeface="Cambria Math" panose="02040503050406030204" pitchFamily="18" charset="0"/>
+                      </a:rPr>
+                      <m:t>,</m:t>
+                    </m:r>
+                    <m:r>
+                      <a:rPr lang="en-US" i="1">
+                        <a:latin typeface="Cambria Math" panose="02040503050406030204" pitchFamily="18" charset="0"/>
+                      </a:rPr>
+                      <m:t>𝑦</m:t>
+                    </m:r>
+                    <m:r>
+                      <a:rPr lang="en-US" i="1">
+                        <a:latin typeface="Cambria Math" panose="02040503050406030204" pitchFamily="18" charset="0"/>
+                      </a:rPr>
+                      <m:t>)</m:t>
+                    </m:r>
+                  </m:oMath>
+                </a14:m>
+                <a:r>
+                  <a:rPr lang="en-US" dirty="0"/>
+                  <a:t> is called a </a:t>
+                </a:r>
+                <a:r>
+                  <a:rPr lang="en-US" dirty="0">
+                    <a:solidFill>
+                      <a:schemeClr val="accent1">
+                        <a:lumMod val="60000"/>
+                        <a:lumOff val="40000"/>
+                      </a:schemeClr>
+                    </a:solidFill>
+                  </a:rPr>
+                  <a:t>statistic</a:t>
+                </a:r>
+              </a:p>
+              <a:p>
+                <a:r>
+                  <a:rPr lang="en-US" dirty="0"/>
+                  <a:t>With this notation:</a:t>
+                </a:r>
+              </a:p>
+              <a:p>
+                <a:pPr lvl="1"/>
+                <a14:m>
+                  <m:oMath xmlns:m="http://schemas.openxmlformats.org/officeDocument/2006/math">
+                    <m:acc>
+                      <m:accPr>
+                        <m:chr m:val="̅"/>
+                        <m:ctrlPr>
+                          <a:rPr lang="en-US" i="1" smtClean="0">
+                            <a:latin typeface="Cambria Math" panose="02040503050406030204" pitchFamily="18" charset="0"/>
+                          </a:rPr>
+                        </m:ctrlPr>
+                      </m:accPr>
+                      <m:e>
+                        <m:r>
+                          <a:rPr lang="en-US" b="0" i="1" smtClean="0">
+                            <a:latin typeface="Cambria Math" panose="02040503050406030204" pitchFamily="18" charset="0"/>
+                          </a:rPr>
+                          <m:t>𝑥</m:t>
+                        </m:r>
+                      </m:e>
+                    </m:acc>
+                    <m:r>
+                      <a:rPr lang="en-US" b="0" i="0" smtClean="0">
+                        <a:latin typeface="Cambria Math" panose="02040503050406030204" pitchFamily="18" charset="0"/>
+                      </a:rPr>
+                      <m:t>= </m:t>
+                    </m:r>
+                    <m:d>
+                      <m:dPr>
+                        <m:begChr m:val="⟨"/>
+                        <m:endChr m:val="⟩"/>
+                        <m:ctrlPr>
+                          <a:rPr lang="en-US" b="0" i="1" smtClean="0">
+                            <a:latin typeface="Cambria Math" panose="02040503050406030204" pitchFamily="18" charset="0"/>
+                          </a:rPr>
+                        </m:ctrlPr>
+                      </m:dPr>
+                      <m:e>
+                        <m:sSub>
+                          <m:sSubPr>
+                            <m:ctrlPr>
+                              <a:rPr lang="en-US" b="0" i="1" smtClean="0">
+                                <a:latin typeface="Cambria Math" panose="02040503050406030204" pitchFamily="18" charset="0"/>
+                              </a:rPr>
+                            </m:ctrlPr>
+                          </m:sSubPr>
+                          <m:e>
+                            <m:r>
+                              <a:rPr lang="en-US" b="0" i="1" smtClean="0">
+                                <a:latin typeface="Cambria Math" panose="02040503050406030204" pitchFamily="18" charset="0"/>
+                              </a:rPr>
+                              <m:t>𝑥</m:t>
+                            </m:r>
+                          </m:e>
+                          <m:sub>
+                            <m:r>
+                              <a:rPr lang="en-US" b="0" i="1" smtClean="0">
+                                <a:latin typeface="Cambria Math" panose="02040503050406030204" pitchFamily="18" charset="0"/>
+                              </a:rPr>
+                              <m:t>𝑖</m:t>
+                            </m:r>
+                          </m:sub>
+                        </m:sSub>
+                      </m:e>
+                    </m:d>
+                    <m:r>
+                      <a:rPr lang="en-US" b="0" i="1" smtClean="0">
+                        <a:latin typeface="Cambria Math" panose="02040503050406030204" pitchFamily="18" charset="0"/>
+                      </a:rPr>
+                      <m:t>,   </m:t>
+                    </m:r>
+                    <m:acc>
+                      <m:accPr>
+                        <m:chr m:val="̅"/>
+                        <m:ctrlPr>
+                          <a:rPr lang="en-US" i="1">
+                            <a:latin typeface="Cambria Math" panose="02040503050406030204" pitchFamily="18" charset="0"/>
+                          </a:rPr>
+                        </m:ctrlPr>
+                      </m:accPr>
+                      <m:e>
+                        <m:r>
+                          <a:rPr lang="en-US" b="0" i="1" smtClean="0">
+                            <a:latin typeface="Cambria Math" panose="02040503050406030204" pitchFamily="18" charset="0"/>
+                          </a:rPr>
+                          <m:t>𝑦</m:t>
+                        </m:r>
+                      </m:e>
+                    </m:acc>
+                    <m:r>
+                      <a:rPr lang="en-US">
+                        <a:latin typeface="Cambria Math" panose="02040503050406030204" pitchFamily="18" charset="0"/>
+                      </a:rPr>
+                      <m:t>= </m:t>
+                    </m:r>
+                    <m:d>
+                      <m:dPr>
+                        <m:begChr m:val="⟨"/>
+                        <m:endChr m:val="⟩"/>
+                        <m:ctrlPr>
+                          <a:rPr lang="en-US" i="1">
+                            <a:latin typeface="Cambria Math" panose="02040503050406030204" pitchFamily="18" charset="0"/>
+                          </a:rPr>
+                        </m:ctrlPr>
+                      </m:dPr>
+                      <m:e>
+                        <m:sSub>
+                          <m:sSubPr>
+                            <m:ctrlPr>
+                              <a:rPr lang="en-US" i="1">
+                                <a:latin typeface="Cambria Math" panose="02040503050406030204" pitchFamily="18" charset="0"/>
+                              </a:rPr>
+                            </m:ctrlPr>
+                          </m:sSubPr>
+                          <m:e>
+                            <m:r>
+                              <a:rPr lang="en-US" b="0" i="1" smtClean="0">
+                                <a:latin typeface="Cambria Math" panose="02040503050406030204" pitchFamily="18" charset="0"/>
+                              </a:rPr>
+                              <m:t>𝑦</m:t>
+                            </m:r>
+                          </m:e>
+                          <m:sub>
+                            <m:r>
+                              <a:rPr lang="en-US" i="1">
+                                <a:latin typeface="Cambria Math" panose="02040503050406030204" pitchFamily="18" charset="0"/>
+                              </a:rPr>
+                              <m:t>𝑖</m:t>
+                            </m:r>
+                          </m:sub>
+                        </m:sSub>
+                      </m:e>
+                    </m:d>
+                  </m:oMath>
+                </a14:m>
+                <a:endParaRPr lang="en-US" dirty="0"/>
+              </a:p>
+              <a:p>
+                <a:pPr lvl="1"/>
+                <a14:m>
+                  <m:oMath xmlns:m="http://schemas.openxmlformats.org/officeDocument/2006/math">
+                    <m:sSub>
+                      <m:sSubPr>
+                        <m:ctrlPr>
+                          <a:rPr lang="en-US" b="0" i="1" smtClean="0">
+                            <a:latin typeface="Cambria Math" panose="02040503050406030204" pitchFamily="18" charset="0"/>
+                          </a:rPr>
+                        </m:ctrlPr>
+                      </m:sSubPr>
+                      <m:e>
+                        <m:r>
+                          <a:rPr lang="en-US" b="0" i="1" smtClean="0">
+                            <a:latin typeface="Cambria Math" panose="02040503050406030204" pitchFamily="18" charset="0"/>
+                          </a:rPr>
+                          <m:t>𝑠</m:t>
+                        </m:r>
+                      </m:e>
+                      <m:sub>
+                        <m:r>
+                          <a:rPr lang="en-US" b="0" i="1" smtClean="0">
+                            <a:latin typeface="Cambria Math" panose="02040503050406030204" pitchFamily="18" charset="0"/>
+                          </a:rPr>
+                          <m:t>𝑥𝑥</m:t>
+                        </m:r>
+                      </m:sub>
+                    </m:sSub>
+                    <m:r>
+                      <a:rPr lang="en-US">
+                        <a:latin typeface="Cambria Math" panose="02040503050406030204" pitchFamily="18" charset="0"/>
+                      </a:rPr>
+                      <m:t>= </m:t>
+                    </m:r>
+                    <m:d>
+                      <m:dPr>
+                        <m:begChr m:val="⟨"/>
+                        <m:endChr m:val="⟩"/>
+                        <m:ctrlPr>
+                          <a:rPr lang="en-US" i="1">
+                            <a:latin typeface="Cambria Math" panose="02040503050406030204" pitchFamily="18" charset="0"/>
+                          </a:rPr>
+                        </m:ctrlPr>
+                      </m:dPr>
                       <m:e>
                         <m:sSup>
                           <m:sSupPr>
@@ -14323,14 +15019,14 @@
                                 <m:sSub>
                                   <m:sSubPr>
                                     <m:ctrlPr>
-                                      <a:rPr lang="en-US" b="0" i="1" smtClean="0">
+                                      <a:rPr lang="en-US" i="1">
                                         <a:latin typeface="Cambria Math" panose="02040503050406030204" pitchFamily="18" charset="0"/>
                                       </a:rPr>
                                     </m:ctrlPr>
                                   </m:sSubPr>
                                   <m:e>
                                     <m:r>
-                                      <a:rPr lang="en-US" b="0" i="1" smtClean="0">
+                                      <a:rPr lang="en-US" i="1">
                                         <a:latin typeface="Cambria Math" panose="02040503050406030204" pitchFamily="18" charset="0"/>
                                       </a:rPr>
                                       <m:t>𝑥</m:t>
@@ -14338,7 +15034,7 @@
                                   </m:e>
                                   <m:sub>
                                     <m:r>
-                                      <a:rPr lang="en-US" b="0" i="1" smtClean="0">
+                                      <a:rPr lang="en-US" i="1">
                                         <a:latin typeface="Cambria Math" panose="02040503050406030204" pitchFamily="18" charset="0"/>
                                       </a:rPr>
                                       <m:t>𝑖</m:t>
@@ -14355,14 +15051,14 @@
                                   <m:accPr>
                                     <m:chr m:val="̅"/>
                                     <m:ctrlPr>
-                                      <a:rPr lang="en-US" b="0" i="1" smtClean="0">
+                                      <a:rPr lang="en-US" i="1">
                                         <a:latin typeface="Cambria Math" panose="02040503050406030204" pitchFamily="18" charset="0"/>
                                       </a:rPr>
                                     </m:ctrlPr>
                                   </m:accPr>
                                   <m:e>
                                     <m:r>
-                                      <a:rPr lang="en-US" b="0" i="1" smtClean="0">
+                                      <a:rPr lang="en-US" i="1">
                                         <a:latin typeface="Cambria Math" panose="02040503050406030204" pitchFamily="18" charset="0"/>
                                       </a:rPr>
                                       <m:t>𝑥</m:t>
@@ -14382,33 +15078,317 @@
                           </m:sup>
                         </m:sSup>
                       </m:e>
-                    </m:nary>
+                    </m:d>
+                    <m:r>
+                      <a:rPr lang="en-US" i="1">
+                        <a:latin typeface="Cambria Math" panose="02040503050406030204" pitchFamily="18" charset="0"/>
+                      </a:rPr>
+                      <m:t>,</m:t>
+                    </m:r>
+                    <m:r>
+                      <a:rPr lang="en-US" b="0" i="1" smtClean="0">
+                        <a:latin typeface="Cambria Math" panose="02040503050406030204" pitchFamily="18" charset="0"/>
+                      </a:rPr>
+                      <m:t>  </m:t>
+                    </m:r>
+                    <m:sSub>
+                      <m:sSubPr>
+                        <m:ctrlPr>
+                          <a:rPr lang="en-US" i="1">
+                            <a:latin typeface="Cambria Math" panose="02040503050406030204" pitchFamily="18" charset="0"/>
+                          </a:rPr>
+                        </m:ctrlPr>
+                      </m:sSubPr>
+                      <m:e>
+                        <m:r>
+                          <a:rPr lang="en-US" i="1">
+                            <a:latin typeface="Cambria Math" panose="02040503050406030204" pitchFamily="18" charset="0"/>
+                          </a:rPr>
+                          <m:t>𝑠</m:t>
+                        </m:r>
+                      </m:e>
+                      <m:sub>
+                        <m:r>
+                          <a:rPr lang="en-US" b="0" i="1" smtClean="0">
+                            <a:latin typeface="Cambria Math" panose="02040503050406030204" pitchFamily="18" charset="0"/>
+                          </a:rPr>
+                          <m:t>𝑦𝑦</m:t>
+                        </m:r>
+                      </m:sub>
+                    </m:sSub>
+                    <m:r>
+                      <a:rPr lang="en-US">
+                        <a:latin typeface="Cambria Math" panose="02040503050406030204" pitchFamily="18" charset="0"/>
+                      </a:rPr>
+                      <m:t>= </m:t>
+                    </m:r>
+                    <m:d>
+                      <m:dPr>
+                        <m:begChr m:val="⟨"/>
+                        <m:endChr m:val="⟩"/>
+                        <m:ctrlPr>
+                          <a:rPr lang="en-US" i="1">
+                            <a:latin typeface="Cambria Math" panose="02040503050406030204" pitchFamily="18" charset="0"/>
+                          </a:rPr>
+                        </m:ctrlPr>
+                      </m:dPr>
+                      <m:e>
+                        <m:sSup>
+                          <m:sSupPr>
+                            <m:ctrlPr>
+                              <a:rPr lang="en-US" i="1">
+                                <a:latin typeface="Cambria Math" panose="02040503050406030204" pitchFamily="18" charset="0"/>
+                              </a:rPr>
+                            </m:ctrlPr>
+                          </m:sSupPr>
+                          <m:e>
+                            <m:d>
+                              <m:dPr>
+                                <m:ctrlPr>
+                                  <a:rPr lang="en-US" i="1">
+                                    <a:latin typeface="Cambria Math" panose="02040503050406030204" pitchFamily="18" charset="0"/>
+                                  </a:rPr>
+                                </m:ctrlPr>
+                              </m:dPr>
+                              <m:e>
+                                <m:sSub>
+                                  <m:sSubPr>
+                                    <m:ctrlPr>
+                                      <a:rPr lang="en-US" i="1">
+                                        <a:latin typeface="Cambria Math" panose="02040503050406030204" pitchFamily="18" charset="0"/>
+                                      </a:rPr>
+                                    </m:ctrlPr>
+                                  </m:sSubPr>
+                                  <m:e>
+                                    <m:r>
+                                      <a:rPr lang="en-US" b="0" i="1" smtClean="0">
+                                        <a:latin typeface="Cambria Math" panose="02040503050406030204" pitchFamily="18" charset="0"/>
+                                      </a:rPr>
+                                      <m:t>𝑦</m:t>
+                                    </m:r>
+                                  </m:e>
+                                  <m:sub>
+                                    <m:r>
+                                      <a:rPr lang="en-US" i="1">
+                                        <a:latin typeface="Cambria Math" panose="02040503050406030204" pitchFamily="18" charset="0"/>
+                                      </a:rPr>
+                                      <m:t>𝑖</m:t>
+                                    </m:r>
+                                  </m:sub>
+                                </m:sSub>
+                                <m:r>
+                                  <a:rPr lang="en-US" i="1">
+                                    <a:latin typeface="Cambria Math" panose="02040503050406030204" pitchFamily="18" charset="0"/>
+                                  </a:rPr>
+                                  <m:t>−</m:t>
+                                </m:r>
+                                <m:acc>
+                                  <m:accPr>
+                                    <m:chr m:val="̅"/>
+                                    <m:ctrlPr>
+                                      <a:rPr lang="en-US" i="1">
+                                        <a:latin typeface="Cambria Math" panose="02040503050406030204" pitchFamily="18" charset="0"/>
+                                      </a:rPr>
+                                    </m:ctrlPr>
+                                  </m:accPr>
+                                  <m:e>
+                                    <m:r>
+                                      <a:rPr lang="en-US" b="0" i="1" smtClean="0">
+                                        <a:latin typeface="Cambria Math" panose="02040503050406030204" pitchFamily="18" charset="0"/>
+                                      </a:rPr>
+                                      <m:t>𝑦</m:t>
+                                    </m:r>
+                                  </m:e>
+                                </m:acc>
+                              </m:e>
+                            </m:d>
+                          </m:e>
+                          <m:sup>
+                            <m:r>
+                              <a:rPr lang="en-US" i="1">
+                                <a:latin typeface="Cambria Math" panose="02040503050406030204" pitchFamily="18" charset="0"/>
+                              </a:rPr>
+                              <m:t>2</m:t>
+                            </m:r>
+                          </m:sup>
+                        </m:sSup>
+                      </m:e>
+                    </m:d>
                   </m:oMath>
                 </a14:m>
                 <a:endParaRPr lang="en-US" dirty="0"/>
               </a:p>
               <a:p>
                 <a:pPr lvl="1"/>
+                <a:endParaRPr lang="en-US" dirty="0"/>
+              </a:p>
+            </p:txBody>
+          </p:sp>
+        </mc:Choice>
+        <mc:Fallback>
+          <p:sp>
+            <p:nvSpPr>
+              <p:cNvPr id="3" name="Content Placeholder 2">
+                <a:extLst>
+                  <a:ext uri="{FF2B5EF4-FFF2-40B4-BE49-F238E27FC236}">
+                    <a16:creationId xmlns:a16="http://schemas.microsoft.com/office/drawing/2014/main" id="{2C2CB76B-6912-4537-BD72-A8A5AC2E8DAB}"/>
+                  </a:ext>
+                </a:extLst>
+              </p:cNvPr>
+              <p:cNvSpPr>
+                <a:spLocks noGrp="1" noRot="1" noChangeAspect="1" noMove="1" noResize="1" noEditPoints="1" noAdjustHandles="1" noChangeArrowheads="1" noChangeShapeType="1" noTextEdit="1"/>
+              </p:cNvSpPr>
+              <p:nvPr>
+                <p:ph idx="1"/>
+              </p:nvPr>
+            </p:nvSpPr>
+            <p:spPr>
+              <a:blipFill>
+                <a:blip r:embed="rId2"/>
+                <a:stretch>
+                  <a:fillRect l="-1455" t="-1549"/>
+                </a:stretch>
+              </a:blipFill>
+            </p:spPr>
+            <p:txBody>
+              <a:bodyPr/>
+              <a:lstStyle/>
+              <a:p>
+                <a:r>
+                  <a:rPr lang="en-US">
+                    <a:noFill/>
+                  </a:rPr>
+                  <a:t> </a:t>
+                </a:r>
+              </a:p>
+            </p:txBody>
+          </p:sp>
+        </mc:Fallback>
+      </mc:AlternateContent>
+      <p:sp>
+        <p:nvSpPr>
+          <p:cNvPr id="4" name="Slide Number Placeholder 3">
+            <a:extLst>
+              <a:ext uri="{FF2B5EF4-FFF2-40B4-BE49-F238E27FC236}">
+                <a16:creationId xmlns:a16="http://schemas.microsoft.com/office/drawing/2014/main" id="{5489D87C-8FF4-4740-B4B5-168669D6948F}"/>
+              </a:ext>
+            </a:extLst>
+          </p:cNvPr>
+          <p:cNvSpPr>
+            <a:spLocks noGrp="1"/>
+          </p:cNvSpPr>
+          <p:nvPr>
+            <p:ph type="sldNum" sz="quarter" idx="12"/>
+          </p:nvPr>
+        </p:nvSpPr>
+        <p:spPr/>
+        <p:txBody>
+          <a:bodyPr/>
+          <a:lstStyle/>
+          <a:p>
+            <a:fld id="{629637A9-119A-49DA-BD12-AAC58B377D80}" type="slidenum">
+              <a:rPr lang="en-US" smtClean="0"/>
+              <a:t>26</a:t>
+            </a:fld>
+            <a:endParaRPr lang="en-US" dirty="0"/>
+          </a:p>
+        </p:txBody>
+      </p:sp>
+    </p:spTree>
+    <p:extLst>
+      <p:ext uri="{BB962C8B-B14F-4D97-AF65-F5344CB8AC3E}">
+        <p14:creationId xmlns:p14="http://schemas.microsoft.com/office/powerpoint/2010/main" val="2307255597"/>
+      </p:ext>
+    </p:extLst>
+  </p:cSld>
+  <p:clrMapOvr>
+    <a:masterClrMapping/>
+  </p:clrMapOvr>
+</p:sld>
+</file>
+
+<file path=ppt/slides/slide27.xml><?xml version="1.0" encoding="utf-8"?>
+<p:sld xmlns:a="http://schemas.openxmlformats.org/drawingml/2006/main" xmlns:r="http://schemas.openxmlformats.org/officeDocument/2006/relationships" xmlns:p="http://schemas.openxmlformats.org/presentationml/2006/main">
+  <p:cSld>
+    <p:spTree>
+      <p:nvGrpSpPr>
+        <p:cNvPr id="1" name=""/>
+        <p:cNvGrpSpPr/>
+        <p:nvPr/>
+      </p:nvGrpSpPr>
+      <p:grpSpPr>
+        <a:xfrm>
+          <a:off x="0" y="0"/>
+          <a:ext cx="0" cy="0"/>
+          <a:chOff x="0" y="0"/>
+          <a:chExt cx="0" cy="0"/>
+        </a:xfrm>
+      </p:grpSpPr>
+      <p:sp>
+        <p:nvSpPr>
+          <p:cNvPr id="2" name="Title 1"/>
+          <p:cNvSpPr>
+            <a:spLocks noGrp="1"/>
+          </p:cNvSpPr>
+          <p:nvPr>
+            <p:ph type="title"/>
+          </p:nvPr>
+        </p:nvSpPr>
+        <p:spPr/>
+        <p:txBody>
+          <a:bodyPr/>
+          <a:lstStyle/>
+          <a:p>
+            <a:r>
+              <a:rPr lang="en-US" dirty="0"/>
+              <a:t>Alternate Equation for Variance</a:t>
+            </a:r>
+          </a:p>
+        </p:txBody>
+      </p:sp>
+      <mc:AlternateContent xmlns:mc="http://schemas.openxmlformats.org/markup-compatibility/2006">
+        <mc:Choice xmlns:a14="http://schemas.microsoft.com/office/drawing/2010/main" Requires="a14">
+          <p:sp>
+            <p:nvSpPr>
+              <p:cNvPr id="3" name="Content Placeholder 2"/>
+              <p:cNvSpPr>
+                <a:spLocks noGrp="1"/>
+              </p:cNvSpPr>
+              <p:nvPr>
+                <p:ph idx="1"/>
+              </p:nvPr>
+            </p:nvSpPr>
+            <p:spPr/>
+            <p:txBody>
+              <a:bodyPr>
+                <a:normAutofit/>
+              </a:bodyPr>
+              <a:lstStyle/>
+              <a:p>
                 <a:r>
                   <a:rPr lang="en-US" dirty="0"/>
-                  <a:t>Alternate formula:  </a:t>
+                  <a:t>Alternate equations for variance and sample co-variance:</a:t>
                 </a:r>
-                <a:br>
-                  <a:rPr lang="en-US" dirty="0"/>
-                </a:br>
+              </a:p>
+              <a:p>
+                <a:pPr lvl="1"/>
+                <a:r>
+                  <a:rPr lang="en-US" b="0" dirty="0"/>
+                  <a:t>Sample variances  </a:t>
+                </a:r>
                 <a14:m>
                   <m:oMath xmlns:m="http://schemas.openxmlformats.org/officeDocument/2006/math">
-                    <m:sSubSup>
-                      <m:sSubSupPr>
+                    <m:sSub>
+                      <m:sSubPr>
                         <m:ctrlPr>
-                          <a:rPr lang="en-US" i="1">
+                          <a:rPr lang="en-US" b="0" i="1" smtClean="0">
                             <a:latin typeface="Cambria Math" panose="02040503050406030204" pitchFamily="18" charset="0"/>
                           </a:rPr>
                         </m:ctrlPr>
-                      </m:sSubSupPr>
+                      </m:sSubPr>
                       <m:e>
                         <m:r>
-                          <a:rPr lang="en-US" i="1">
+                          <a:rPr lang="en-US" b="0" i="1" smtClean="0">
                             <a:latin typeface="Cambria Math" panose="02040503050406030204" pitchFamily="18" charset="0"/>
                           </a:rPr>
                           <m:t>𝑠</m:t>
@@ -14416,65 +15396,29 @@
                       </m:e>
                       <m:sub>
                         <m:r>
-                          <a:rPr lang="en-US" i="1">
-                            <a:latin typeface="Cambria Math" panose="02040503050406030204" pitchFamily="18" charset="0"/>
-                          </a:rPr>
-                          <m:t>𝑥</m:t>
+                          <a:rPr lang="en-US" b="0" i="1" smtClean="0">
+                            <a:latin typeface="Cambria Math" panose="02040503050406030204" pitchFamily="18" charset="0"/>
+                          </a:rPr>
+                          <m:t>𝑥𝑥</m:t>
                         </m:r>
                       </m:sub>
-                      <m:sup>
-                        <m:r>
-                          <a:rPr lang="en-US" i="1">
-                            <a:latin typeface="Cambria Math" panose="02040503050406030204" pitchFamily="18" charset="0"/>
-                          </a:rPr>
-                          <m:t>2</m:t>
-                        </m:r>
-                      </m:sup>
-                    </m:sSubSup>
+                    </m:sSub>
                     <m:r>
-                      <a:rPr lang="en-US" i="1">
+                      <a:rPr lang="en-US" b="0" i="1" smtClean="0">
                         <a:latin typeface="Cambria Math" panose="02040503050406030204" pitchFamily="18" charset="0"/>
                       </a:rPr>
                       <m:t>=</m:t>
                     </m:r>
-                    <m:f>
-                      <m:fPr>
+                    <m:d>
+                      <m:dPr>
+                        <m:begChr m:val="⟨"/>
+                        <m:endChr m:val="⟩"/>
                         <m:ctrlPr>
-                          <a:rPr lang="en-US" i="1">
+                          <a:rPr lang="en-US" b="0" i="1" smtClean="0">
                             <a:latin typeface="Cambria Math" panose="02040503050406030204" pitchFamily="18" charset="0"/>
                           </a:rPr>
                         </m:ctrlPr>
-                      </m:fPr>
-                      <m:num>
-                        <m:r>
-                          <a:rPr lang="en-US" i="1">
-                            <a:latin typeface="Cambria Math" panose="02040503050406030204" pitchFamily="18" charset="0"/>
-                          </a:rPr>
-                          <m:t>1</m:t>
-                        </m:r>
-                      </m:num>
-                      <m:den>
-                        <m:r>
-                          <a:rPr lang="en-US" i="1">
-                            <a:latin typeface="Cambria Math" panose="02040503050406030204" pitchFamily="18" charset="0"/>
-                          </a:rPr>
-                          <m:t>𝑁</m:t>
-                        </m:r>
-                      </m:den>
-                    </m:f>
-                    <m:nary>
-                      <m:naryPr>
-                        <m:chr m:val="∑"/>
-                        <m:subHide m:val="on"/>
-                        <m:supHide m:val="on"/>
-                        <m:ctrlPr>
-                          <a:rPr lang="en-US" i="1">
-                            <a:latin typeface="Cambria Math" panose="02040503050406030204" pitchFamily="18" charset="0"/>
-                          </a:rPr>
-                        </m:ctrlPr>
-                      </m:naryPr>
-                      <m:sub/>
-                      <m:sup/>
+                      </m:dPr>
                       <m:e>
                         <m:sSubSup>
                           <m:sSubSupPr>
@@ -14510,7 +15454,7 @@
                           </m:sup>
                         </m:sSubSup>
                       </m:e>
-                    </m:nary>
+                    </m:d>
                     <m:r>
                       <a:rPr lang="en-US" b="0" i="1" smtClean="0">
                         <a:latin typeface="Cambria Math" panose="02040503050406030204" pitchFamily="18" charset="0"/>
@@ -14528,79 +15472,40 @@
                       <m:e>
                         <m:d>
                           <m:dPr>
+                            <m:begChr m:val="⟨"/>
+                            <m:endChr m:val="⟩"/>
                             <m:ctrlPr>
-                              <a:rPr lang="en-US" b="0" i="1" smtClean="0">
+                              <a:rPr lang="en-US" i="1">
                                 <a:latin typeface="Cambria Math" panose="02040503050406030204" pitchFamily="18" charset="0"/>
                               </a:rPr>
                             </m:ctrlPr>
                           </m:dPr>
                           <m:e>
-                            <m:f>
-                              <m:fPr>
+                            <m:sSub>
+                              <m:sSubPr>
                                 <m:ctrlPr>
-                                  <a:rPr lang="en-US" i="1">
+                                  <a:rPr lang="en-US" b="0" i="1" smtClean="0">
                                     <a:latin typeface="Cambria Math" panose="02040503050406030204" pitchFamily="18" charset="0"/>
                                   </a:rPr>
                                 </m:ctrlPr>
-                              </m:fPr>
-                              <m:num>
+                              </m:sSubPr>
+                              <m:e>
                                 <m:r>
-                                  <a:rPr lang="en-US" i="1">
+                                  <a:rPr lang="en-US" b="0" i="1" smtClean="0">
                                     <a:latin typeface="Cambria Math" panose="02040503050406030204" pitchFamily="18" charset="0"/>
                                   </a:rPr>
-                                  <m:t>1</m:t>
+                                  <m:t>𝑥</m:t>
                                 </m:r>
-                              </m:num>
-                              <m:den>
+                              </m:e>
+                              <m:sub>
                                 <m:r>
-                                  <a:rPr lang="en-US" i="1">
+                                  <a:rPr lang="en-US" b="0" i="1" smtClean="0">
                                     <a:latin typeface="Cambria Math" panose="02040503050406030204" pitchFamily="18" charset="0"/>
                                   </a:rPr>
-                                  <m:t>𝑁</m:t>
+                                  <m:t>𝑖</m:t>
                                 </m:r>
-                              </m:den>
-                            </m:f>
-                            <m:nary>
-                              <m:naryPr>
-                                <m:chr m:val="∑"/>
-                                <m:subHide m:val="on"/>
-                                <m:supHide m:val="on"/>
-                                <m:ctrlPr>
-                                  <a:rPr lang="en-US" i="1">
-                                    <a:latin typeface="Cambria Math" panose="02040503050406030204" pitchFamily="18" charset="0"/>
-                                  </a:rPr>
-                                </m:ctrlPr>
-                              </m:naryPr>
-                              <m:sub/>
-                              <m:sup/>
-                              <m:e>
-                                <m:sSub>
-                                  <m:sSubPr>
-                                    <m:ctrlPr>
-                                      <a:rPr lang="en-US" i="1">
-                                        <a:latin typeface="Cambria Math" panose="02040503050406030204" pitchFamily="18" charset="0"/>
-                                      </a:rPr>
-                                    </m:ctrlPr>
-                                  </m:sSubPr>
-                                  <m:e>
-                                    <m:r>
-                                      <a:rPr lang="en-US" i="1">
-                                        <a:latin typeface="Cambria Math" panose="02040503050406030204" pitchFamily="18" charset="0"/>
-                                      </a:rPr>
-                                      <m:t>𝑥</m:t>
-                                    </m:r>
-                                  </m:e>
-                                  <m:sub>
-                                    <m:r>
-                                      <a:rPr lang="en-US" i="1">
-                                        <a:latin typeface="Cambria Math" panose="02040503050406030204" pitchFamily="18" charset="0"/>
-                                      </a:rPr>
-                                      <m:t>𝑖</m:t>
-                                    </m:r>
-                                  </m:sub>
-                                </m:sSub>
-                              </m:e>
-                            </m:nary>
+                              </m:sub>
+                            </m:sSub>
                           </m:e>
                         </m:d>
                       </m:e>
@@ -14617,46 +15522,49 @@
                       <a:rPr lang="en-US" b="0" i="1" smtClean="0">
                         <a:latin typeface="Cambria Math" panose="02040503050406030204" pitchFamily="18" charset="0"/>
                       </a:rPr>
+                      <m:t>,  </m:t>
+                    </m:r>
+                    <m:sSub>
+                      <m:sSubPr>
+                        <m:ctrlPr>
+                          <a:rPr lang="en-US" i="1">
+                            <a:latin typeface="Cambria Math" panose="02040503050406030204" pitchFamily="18" charset="0"/>
+                          </a:rPr>
+                        </m:ctrlPr>
+                      </m:sSubPr>
+                      <m:e>
+                        <m:r>
+                          <a:rPr lang="en-US" i="1">
+                            <a:latin typeface="Cambria Math" panose="02040503050406030204" pitchFamily="18" charset="0"/>
+                          </a:rPr>
+                          <m:t>𝑠</m:t>
+                        </m:r>
+                      </m:e>
+                      <m:sub>
+                        <m:r>
+                          <a:rPr lang="en-US" b="0" i="1" smtClean="0">
+                            <a:latin typeface="Cambria Math" panose="02040503050406030204" pitchFamily="18" charset="0"/>
+                          </a:rPr>
+                          <m:t>𝑦𝑦</m:t>
+                        </m:r>
+                      </m:sub>
+                    </m:sSub>
+                    <m:r>
+                      <a:rPr lang="en-US" i="1">
+                        <a:latin typeface="Cambria Math" panose="02040503050406030204" pitchFamily="18" charset="0"/>
+                      </a:rPr>
                       <m:t>=</m:t>
                     </m:r>
-                    <m:f>
-                      <m:fPr>
+                    <m:d>
+                      <m:dPr>
+                        <m:begChr m:val="⟨"/>
+                        <m:endChr m:val="⟩"/>
                         <m:ctrlPr>
                           <a:rPr lang="en-US" i="1">
                             <a:latin typeface="Cambria Math" panose="02040503050406030204" pitchFamily="18" charset="0"/>
                           </a:rPr>
                         </m:ctrlPr>
-                      </m:fPr>
-                      <m:num>
-                        <m:r>
-                          <a:rPr lang="en-US" i="1">
-                            <a:latin typeface="Cambria Math" panose="02040503050406030204" pitchFamily="18" charset="0"/>
-                          </a:rPr>
-                          <m:t>1</m:t>
-                        </m:r>
-                      </m:num>
-                      <m:den>
-                        <m:r>
-                          <a:rPr lang="en-US" i="1">
-                            <a:latin typeface="Cambria Math" panose="02040503050406030204" pitchFamily="18" charset="0"/>
-                          </a:rPr>
-                          <m:t>𝑁</m:t>
-                        </m:r>
-                      </m:den>
-                    </m:f>
-                    <m:nary>
-                      <m:naryPr>
-                        <m:chr m:val="∑"/>
-                        <m:subHide m:val="on"/>
-                        <m:supHide m:val="on"/>
-                        <m:ctrlPr>
-                          <a:rPr lang="en-US" i="1">
-                            <a:latin typeface="Cambria Math" panose="02040503050406030204" pitchFamily="18" charset="0"/>
-                          </a:rPr>
-                        </m:ctrlPr>
-                      </m:naryPr>
-                      <m:sub/>
-                      <m:sup/>
+                      </m:dPr>
                       <m:e>
                         <m:sSubSup>
                           <m:sSubSupPr>
@@ -14668,10 +15576,10 @@
                           </m:sSubSupPr>
                           <m:e>
                             <m:r>
-                              <a:rPr lang="en-US" i="1">
+                              <a:rPr lang="en-US" b="0" i="1" smtClean="0">
                                 <a:latin typeface="Cambria Math" panose="02040503050406030204" pitchFamily="18" charset="0"/>
                               </a:rPr>
-                              <m:t>𝑥</m:t>
+                              <m:t>𝑦</m:t>
                             </m:r>
                           </m:e>
                           <m:sub>
@@ -14692,7 +15600,7 @@
                           </m:sup>
                         </m:sSubSup>
                       </m:e>
-                    </m:nary>
+                    </m:d>
                     <m:r>
                       <a:rPr lang="en-US" i="1">
                         <a:latin typeface="Cambria Math" panose="02040503050406030204" pitchFamily="18" charset="0"/>
@@ -14702,34 +15610,54 @@
                     <m:sSup>
                       <m:sSupPr>
                         <m:ctrlPr>
-                          <a:rPr lang="en-US" b="0" i="1" smtClean="0">
+                          <a:rPr lang="en-US" i="1">
                             <a:latin typeface="Cambria Math" panose="02040503050406030204" pitchFamily="18" charset="0"/>
                           </a:rPr>
                         </m:ctrlPr>
                       </m:sSupPr>
                       <m:e>
-                        <m:acc>
-                          <m:accPr>
-                            <m:chr m:val="̅"/>
+                        <m:d>
+                          <m:dPr>
+                            <m:begChr m:val="⟨"/>
+                            <m:endChr m:val="⟩"/>
                             <m:ctrlPr>
-                              <a:rPr lang="en-US" i="1" smtClean="0">
+                              <a:rPr lang="en-US" i="1">
                                 <a:latin typeface="Cambria Math" panose="02040503050406030204" pitchFamily="18" charset="0"/>
                               </a:rPr>
                             </m:ctrlPr>
-                          </m:accPr>
+                          </m:dPr>
                           <m:e>
-                            <m:r>
-                              <a:rPr lang="en-US" b="0" i="1" smtClean="0">
-                                <a:latin typeface="Cambria Math" panose="02040503050406030204" pitchFamily="18" charset="0"/>
-                              </a:rPr>
-                              <m:t>𝑥</m:t>
-                            </m:r>
+                            <m:sSub>
+                              <m:sSubPr>
+                                <m:ctrlPr>
+                                  <a:rPr lang="en-US" i="1">
+                                    <a:latin typeface="Cambria Math" panose="02040503050406030204" pitchFamily="18" charset="0"/>
+                                  </a:rPr>
+                                </m:ctrlPr>
+                              </m:sSubPr>
+                              <m:e>
+                                <m:r>
+                                  <a:rPr lang="en-US" b="0" i="1" smtClean="0">
+                                    <a:latin typeface="Cambria Math" panose="02040503050406030204" pitchFamily="18" charset="0"/>
+                                  </a:rPr>
+                                  <m:t>𝑦</m:t>
+                                </m:r>
+                              </m:e>
+                              <m:sub>
+                                <m:r>
+                                  <a:rPr lang="en-US" i="1">
+                                    <a:latin typeface="Cambria Math" panose="02040503050406030204" pitchFamily="18" charset="0"/>
+                                  </a:rPr>
+                                  <m:t>𝑖</m:t>
+                                </m:r>
+                              </m:sub>
+                            </m:sSub>
                           </m:e>
-                        </m:acc>
+                        </m:d>
                       </m:e>
                       <m:sup>
                         <m:r>
-                          <a:rPr lang="en-US" b="0" i="1" smtClean="0">
+                          <a:rPr lang="en-US" i="1">
                             <a:latin typeface="Cambria Math" panose="02040503050406030204" pitchFamily="18" charset="0"/>
                           </a:rPr>
                           <m:t>2</m:t>
@@ -14738,29 +15666,27 @@
                     </m:sSup>
                   </m:oMath>
                 </a14:m>
-                <a:endParaRPr lang="en-US" b="0" dirty="0"/>
+                <a:endParaRPr lang="en-US" dirty="0"/>
               </a:p>
               <a:p>
+                <a:pPr lvl="1"/>
                 <a:r>
                   <a:rPr lang="en-US" dirty="0"/>
-                  <a:t>Similarly, for covariance:</a:t>
+                  <a:t>Sample co-variance  </a:t>
                 </a:r>
-                <a:br>
-                  <a:rPr lang="en-US" dirty="0"/>
-                </a:br>
                 <a14:m>
                   <m:oMath xmlns:m="http://schemas.openxmlformats.org/officeDocument/2006/math">
                     <m:sSub>
                       <m:sSubPr>
                         <m:ctrlPr>
-                          <a:rPr lang="en-US" b="0" i="1" smtClean="0">
+                          <a:rPr lang="en-US" i="1">
                             <a:latin typeface="Cambria Math" panose="02040503050406030204" pitchFamily="18" charset="0"/>
                           </a:rPr>
                         </m:ctrlPr>
                       </m:sSubPr>
                       <m:e>
                         <m:r>
-                          <a:rPr lang="en-US" b="0" i="1" smtClean="0">
+                          <a:rPr lang="en-US" i="1">
                             <a:latin typeface="Cambria Math" panose="02040503050406030204" pitchFamily="18" charset="0"/>
                           </a:rPr>
                           <m:t>𝑠</m:t>
@@ -14768,57 +15694,35 @@
                       </m:e>
                       <m:sub>
                         <m:r>
+                          <a:rPr lang="en-US" i="1">
+                            <a:latin typeface="Cambria Math" panose="02040503050406030204" pitchFamily="18" charset="0"/>
+                          </a:rPr>
+                          <m:t>𝑥</m:t>
+                        </m:r>
+                        <m:r>
                           <a:rPr lang="en-US" b="0" i="1" smtClean="0">
                             <a:latin typeface="Cambria Math" panose="02040503050406030204" pitchFamily="18" charset="0"/>
                           </a:rPr>
-                          <m:t>𝑥𝑦</m:t>
+                          <m:t>𝑦</m:t>
                         </m:r>
                       </m:sub>
                     </m:sSub>
                     <m:r>
-                      <a:rPr lang="en-US" b="0" i="1" smtClean="0">
+                      <a:rPr lang="en-US" i="1">
                         <a:latin typeface="Cambria Math" panose="02040503050406030204" pitchFamily="18" charset="0"/>
                       </a:rPr>
                       <m:t>=</m:t>
                     </m:r>
-                    <m:f>
-                      <m:fPr>
+                    <m:d>
+                      <m:dPr>
+                        <m:begChr m:val="⟨"/>
+                        <m:endChr m:val="⟩"/>
                         <m:ctrlPr>
                           <a:rPr lang="en-US" i="1">
                             <a:latin typeface="Cambria Math" panose="02040503050406030204" pitchFamily="18" charset="0"/>
                           </a:rPr>
                         </m:ctrlPr>
-                      </m:fPr>
-                      <m:num>
-                        <m:r>
-                          <a:rPr lang="en-US" i="1">
-                            <a:latin typeface="Cambria Math" panose="02040503050406030204" pitchFamily="18" charset="0"/>
-                          </a:rPr>
-                          <m:t>1</m:t>
-                        </m:r>
-                      </m:num>
-                      <m:den>
-                        <m:r>
-                          <a:rPr lang="en-US" i="1">
-                            <a:latin typeface="Cambria Math" panose="02040503050406030204" pitchFamily="18" charset="0"/>
-                          </a:rPr>
-                          <m:t>𝑁</m:t>
-                        </m:r>
-                      </m:den>
-                    </m:f>
-                    <m:nary>
-                      <m:naryPr>
-                        <m:chr m:val="∑"/>
-                        <m:subHide m:val="on"/>
-                        <m:supHide m:val="on"/>
-                        <m:ctrlPr>
-                          <a:rPr lang="en-US" i="1">
-                            <a:latin typeface="Cambria Math" panose="02040503050406030204" pitchFamily="18" charset="0"/>
-                          </a:rPr>
-                        </m:ctrlPr>
-                      </m:naryPr>
-                      <m:sub/>
-                      <m:sup/>
+                      </m:dPr>
                       <m:e>
                         <m:sSub>
                           <m:sSubPr>
@@ -14871,33 +15775,1189 @@
                           </m:sub>
                         </m:sSub>
                       </m:e>
-                    </m:nary>
+                    </m:d>
                     <m:r>
                       <a:rPr lang="en-US" i="1">
                         <a:latin typeface="Cambria Math" panose="02040503050406030204" pitchFamily="18" charset="0"/>
                       </a:rPr>
                       <m:t>−</m:t>
                     </m:r>
+                    <m:d>
+                      <m:dPr>
+                        <m:begChr m:val="⟨"/>
+                        <m:endChr m:val="⟩"/>
+                        <m:ctrlPr>
+                          <a:rPr lang="en-US" i="1">
+                            <a:latin typeface="Cambria Math" panose="02040503050406030204" pitchFamily="18" charset="0"/>
+                          </a:rPr>
+                        </m:ctrlPr>
+                      </m:dPr>
+                      <m:e>
+                        <m:sSub>
+                          <m:sSubPr>
+                            <m:ctrlPr>
+                              <a:rPr lang="en-US" i="1">
+                                <a:latin typeface="Cambria Math" panose="02040503050406030204" pitchFamily="18" charset="0"/>
+                              </a:rPr>
+                            </m:ctrlPr>
+                          </m:sSubPr>
+                          <m:e>
+                            <m:r>
+                              <a:rPr lang="en-US" i="1">
+                                <a:latin typeface="Cambria Math" panose="02040503050406030204" pitchFamily="18" charset="0"/>
+                              </a:rPr>
+                              <m:t>𝑥</m:t>
+                            </m:r>
+                          </m:e>
+                          <m:sub>
+                            <m:r>
+                              <a:rPr lang="en-US" i="1">
+                                <a:latin typeface="Cambria Math" panose="02040503050406030204" pitchFamily="18" charset="0"/>
+                              </a:rPr>
+                              <m:t>𝑖</m:t>
+                            </m:r>
+                          </m:sub>
+                        </m:sSub>
+                      </m:e>
+                    </m:d>
+                    <m:d>
+                      <m:dPr>
+                        <m:begChr m:val="⟨"/>
+                        <m:endChr m:val="⟩"/>
+                        <m:ctrlPr>
+                          <a:rPr lang="en-US" i="1">
+                            <a:latin typeface="Cambria Math" panose="02040503050406030204" pitchFamily="18" charset="0"/>
+                          </a:rPr>
+                        </m:ctrlPr>
+                      </m:dPr>
+                      <m:e>
+                        <m:sSub>
+                          <m:sSubPr>
+                            <m:ctrlPr>
+                              <a:rPr lang="en-US" i="1">
+                                <a:latin typeface="Cambria Math" panose="02040503050406030204" pitchFamily="18" charset="0"/>
+                              </a:rPr>
+                            </m:ctrlPr>
+                          </m:sSubPr>
+                          <m:e>
+                            <m:r>
+                              <a:rPr lang="en-US" b="0" i="1" smtClean="0">
+                                <a:latin typeface="Cambria Math" panose="02040503050406030204" pitchFamily="18" charset="0"/>
+                              </a:rPr>
+                              <m:t>𝑦</m:t>
+                            </m:r>
+                          </m:e>
+                          <m:sub>
+                            <m:r>
+                              <a:rPr lang="en-US" i="1">
+                                <a:latin typeface="Cambria Math" panose="02040503050406030204" pitchFamily="18" charset="0"/>
+                              </a:rPr>
+                              <m:t>𝑖</m:t>
+                            </m:r>
+                          </m:sub>
+                        </m:sSub>
+                      </m:e>
+                    </m:d>
+                  </m:oMath>
+                </a14:m>
+                <a:endParaRPr lang="en-US" dirty="0"/>
+              </a:p>
+              <a:p>
+                <a:endParaRPr lang="en-US" dirty="0"/>
+              </a:p>
+              <a:p>
+                <a:r>
+                  <a:rPr lang="en-US" dirty="0"/>
+                  <a:t>Proof:</a:t>
+                </a:r>
+              </a:p>
+              <a:p>
+                <a:pPr lvl="1"/>
+                <a14:m>
+                  <m:oMath xmlns:m="http://schemas.openxmlformats.org/officeDocument/2006/math">
+                    <m:sSub>
+                      <m:sSubPr>
+                        <m:ctrlPr>
+                          <a:rPr lang="en-US" b="0" i="1" smtClean="0">
+                            <a:latin typeface="Cambria Math" panose="02040503050406030204" pitchFamily="18" charset="0"/>
+                          </a:rPr>
+                        </m:ctrlPr>
+                      </m:sSubPr>
+                      <m:e>
+                        <m:r>
+                          <a:rPr lang="en-US" b="0" i="1" smtClean="0">
+                            <a:latin typeface="Cambria Math" panose="02040503050406030204" pitchFamily="18" charset="0"/>
+                          </a:rPr>
+                          <m:t>𝑠</m:t>
+                        </m:r>
+                      </m:e>
+                      <m:sub>
+                        <m:r>
+                          <a:rPr lang="en-US" b="0" i="1" smtClean="0">
+                            <a:latin typeface="Cambria Math" panose="02040503050406030204" pitchFamily="18" charset="0"/>
+                          </a:rPr>
+                          <m:t>𝑥𝑥</m:t>
+                        </m:r>
+                      </m:sub>
+                    </m:sSub>
+                    <m:r>
+                      <a:rPr lang="en-US" i="1">
+                        <a:latin typeface="Cambria Math" panose="02040503050406030204" pitchFamily="18" charset="0"/>
+                      </a:rPr>
+                      <m:t>=</m:t>
+                    </m:r>
+                    <m:f>
+                      <m:fPr>
+                        <m:ctrlPr>
+                          <a:rPr lang="en-US" i="1">
+                            <a:latin typeface="Cambria Math" panose="02040503050406030204" pitchFamily="18" charset="0"/>
+                          </a:rPr>
+                        </m:ctrlPr>
+                      </m:fPr>
+                      <m:num>
+                        <m:r>
+                          <a:rPr lang="en-US" i="1">
+                            <a:latin typeface="Cambria Math" panose="02040503050406030204" pitchFamily="18" charset="0"/>
+                          </a:rPr>
+                          <m:t>1</m:t>
+                        </m:r>
+                      </m:num>
+                      <m:den>
+                        <m:r>
+                          <a:rPr lang="en-US" i="1">
+                            <a:latin typeface="Cambria Math" panose="02040503050406030204" pitchFamily="18" charset="0"/>
+                          </a:rPr>
+                          <m:t>𝑁</m:t>
+                        </m:r>
+                      </m:den>
+                    </m:f>
+                    <m:nary>
+                      <m:naryPr>
+                        <m:chr m:val="∑"/>
+                        <m:subHide m:val="on"/>
+                        <m:supHide m:val="on"/>
+                        <m:ctrlPr>
+                          <a:rPr lang="en-US" i="1">
+                            <a:latin typeface="Cambria Math" panose="02040503050406030204" pitchFamily="18" charset="0"/>
+                          </a:rPr>
+                        </m:ctrlPr>
+                      </m:naryPr>
+                      <m:sub/>
+                      <m:sup/>
+                      <m:e>
+                        <m:sSup>
+                          <m:sSupPr>
+                            <m:ctrlPr>
+                              <a:rPr lang="en-US" i="1">
+                                <a:latin typeface="Cambria Math" panose="02040503050406030204" pitchFamily="18" charset="0"/>
+                              </a:rPr>
+                            </m:ctrlPr>
+                          </m:sSupPr>
+                          <m:e>
+                            <m:d>
+                              <m:dPr>
+                                <m:ctrlPr>
+                                  <a:rPr lang="en-US" i="1">
+                                    <a:latin typeface="Cambria Math" panose="02040503050406030204" pitchFamily="18" charset="0"/>
+                                  </a:rPr>
+                                </m:ctrlPr>
+                              </m:dPr>
+                              <m:e>
+                                <m:sSub>
+                                  <m:sSubPr>
+                                    <m:ctrlPr>
+                                      <a:rPr lang="en-US" i="1">
+                                        <a:latin typeface="Cambria Math" panose="02040503050406030204" pitchFamily="18" charset="0"/>
+                                      </a:rPr>
+                                    </m:ctrlPr>
+                                  </m:sSubPr>
+                                  <m:e>
+                                    <m:r>
+                                      <a:rPr lang="en-US" i="1">
+                                        <a:latin typeface="Cambria Math" panose="02040503050406030204" pitchFamily="18" charset="0"/>
+                                      </a:rPr>
+                                      <m:t>𝑥</m:t>
+                                    </m:r>
+                                  </m:e>
+                                  <m:sub>
+                                    <m:r>
+                                      <a:rPr lang="en-US" i="1">
+                                        <a:latin typeface="Cambria Math" panose="02040503050406030204" pitchFamily="18" charset="0"/>
+                                      </a:rPr>
+                                      <m:t>𝑖</m:t>
+                                    </m:r>
+                                  </m:sub>
+                                </m:sSub>
+                                <m:r>
+                                  <a:rPr lang="en-US" i="1">
+                                    <a:latin typeface="Cambria Math" panose="02040503050406030204" pitchFamily="18" charset="0"/>
+                                  </a:rPr>
+                                  <m:t>−</m:t>
+                                </m:r>
+                                <m:acc>
+                                  <m:accPr>
+                                    <m:chr m:val="̅"/>
+                                    <m:ctrlPr>
+                                      <a:rPr lang="en-US" i="1">
+                                        <a:latin typeface="Cambria Math" panose="02040503050406030204" pitchFamily="18" charset="0"/>
+                                      </a:rPr>
+                                    </m:ctrlPr>
+                                  </m:accPr>
+                                  <m:e>
+                                    <m:r>
+                                      <a:rPr lang="en-US" i="1">
+                                        <a:latin typeface="Cambria Math" panose="02040503050406030204" pitchFamily="18" charset="0"/>
+                                      </a:rPr>
+                                      <m:t>𝑥</m:t>
+                                    </m:r>
+                                  </m:e>
+                                </m:acc>
+                              </m:e>
+                            </m:d>
+                          </m:e>
+                          <m:sup>
+                            <m:r>
+                              <a:rPr lang="en-US" i="1">
+                                <a:latin typeface="Cambria Math" panose="02040503050406030204" pitchFamily="18" charset="0"/>
+                              </a:rPr>
+                              <m:t>2</m:t>
+                            </m:r>
+                          </m:sup>
+                        </m:sSup>
+                      </m:e>
+                    </m:nary>
+                    <m:r>
+                      <a:rPr lang="en-US" b="0" i="1" smtClean="0">
+                        <a:latin typeface="Cambria Math" panose="02040503050406030204" pitchFamily="18" charset="0"/>
+                      </a:rPr>
+                      <m:t>=</m:t>
+                    </m:r>
+                    <m:f>
+                      <m:fPr>
+                        <m:ctrlPr>
+                          <a:rPr lang="en-US" i="1">
+                            <a:latin typeface="Cambria Math" panose="02040503050406030204" pitchFamily="18" charset="0"/>
+                          </a:rPr>
+                        </m:ctrlPr>
+                      </m:fPr>
+                      <m:num>
+                        <m:r>
+                          <a:rPr lang="en-US" i="1">
+                            <a:latin typeface="Cambria Math" panose="02040503050406030204" pitchFamily="18" charset="0"/>
+                          </a:rPr>
+                          <m:t>1</m:t>
+                        </m:r>
+                      </m:num>
+                      <m:den>
+                        <m:r>
+                          <a:rPr lang="en-US" i="1">
+                            <a:latin typeface="Cambria Math" panose="02040503050406030204" pitchFamily="18" charset="0"/>
+                          </a:rPr>
+                          <m:t>𝑁</m:t>
+                        </m:r>
+                      </m:den>
+                    </m:f>
+                    <m:nary>
+                      <m:naryPr>
+                        <m:chr m:val="∑"/>
+                        <m:subHide m:val="on"/>
+                        <m:supHide m:val="on"/>
+                        <m:ctrlPr>
+                          <a:rPr lang="en-US" i="1">
+                            <a:latin typeface="Cambria Math" panose="02040503050406030204" pitchFamily="18" charset="0"/>
+                          </a:rPr>
+                        </m:ctrlPr>
+                      </m:naryPr>
+                      <m:sub/>
+                      <m:sup/>
+                      <m:e>
+                        <m:r>
+                          <a:rPr lang="en-US" b="0" i="1" smtClean="0">
+                            <a:latin typeface="Cambria Math" panose="02040503050406030204" pitchFamily="18" charset="0"/>
+                          </a:rPr>
+                          <m:t>(</m:t>
+                        </m:r>
+                        <m:sSubSup>
+                          <m:sSubSupPr>
+                            <m:ctrlPr>
+                              <a:rPr lang="en-US" i="1">
+                                <a:latin typeface="Cambria Math" panose="02040503050406030204" pitchFamily="18" charset="0"/>
+                              </a:rPr>
+                            </m:ctrlPr>
+                          </m:sSubSupPr>
+                          <m:e>
+                            <m:r>
+                              <a:rPr lang="en-US" i="1">
+                                <a:latin typeface="Cambria Math" panose="02040503050406030204" pitchFamily="18" charset="0"/>
+                              </a:rPr>
+                              <m:t>𝑥</m:t>
+                            </m:r>
+                          </m:e>
+                          <m:sub>
+                            <m:r>
+                              <a:rPr lang="en-US" i="1">
+                                <a:latin typeface="Cambria Math" panose="02040503050406030204" pitchFamily="18" charset="0"/>
+                              </a:rPr>
+                              <m:t>𝑖</m:t>
+                            </m:r>
+                          </m:sub>
+                          <m:sup>
+                            <m:r>
+                              <a:rPr lang="en-US" i="1">
+                                <a:latin typeface="Cambria Math" panose="02040503050406030204" pitchFamily="18" charset="0"/>
+                              </a:rPr>
+                              <m:t>2</m:t>
+                            </m:r>
+                          </m:sup>
+                        </m:sSubSup>
+                        <m:r>
+                          <a:rPr lang="en-US" i="1">
+                            <a:latin typeface="Cambria Math" panose="02040503050406030204" pitchFamily="18" charset="0"/>
+                          </a:rPr>
+                          <m:t>−</m:t>
+                        </m:r>
+                        <m:r>
+                          <a:rPr lang="en-US" b="0" i="1" smtClean="0">
+                            <a:latin typeface="Cambria Math" panose="02040503050406030204" pitchFamily="18" charset="0"/>
+                          </a:rPr>
+                          <m:t>2</m:t>
+                        </m:r>
+                        <m:sSub>
+                          <m:sSubPr>
+                            <m:ctrlPr>
+                              <a:rPr lang="en-US" b="0" i="1" smtClean="0">
+                                <a:latin typeface="Cambria Math" panose="02040503050406030204" pitchFamily="18" charset="0"/>
+                              </a:rPr>
+                            </m:ctrlPr>
+                          </m:sSubPr>
+                          <m:e>
+                            <m:r>
+                              <a:rPr lang="en-US" b="0" i="1" smtClean="0">
+                                <a:latin typeface="Cambria Math" panose="02040503050406030204" pitchFamily="18" charset="0"/>
+                              </a:rPr>
+                              <m:t>𝑥</m:t>
+                            </m:r>
+                          </m:e>
+                          <m:sub>
+                            <m:r>
+                              <a:rPr lang="en-US" b="0" i="1" smtClean="0">
+                                <a:latin typeface="Cambria Math" panose="02040503050406030204" pitchFamily="18" charset="0"/>
+                              </a:rPr>
+                              <m:t>𝑖</m:t>
+                            </m:r>
+                          </m:sub>
+                        </m:sSub>
+                        <m:acc>
+                          <m:accPr>
+                            <m:chr m:val="̅"/>
+                            <m:ctrlPr>
+                              <a:rPr lang="en-US" i="1">
+                                <a:latin typeface="Cambria Math" panose="02040503050406030204" pitchFamily="18" charset="0"/>
+                              </a:rPr>
+                            </m:ctrlPr>
+                          </m:accPr>
+                          <m:e>
+                            <m:r>
+                              <a:rPr lang="en-US" i="1">
+                                <a:latin typeface="Cambria Math" panose="02040503050406030204" pitchFamily="18" charset="0"/>
+                              </a:rPr>
+                              <m:t>𝑥</m:t>
+                            </m:r>
+                          </m:e>
+                        </m:acc>
+                        <m:r>
+                          <a:rPr lang="en-US" b="0" i="1" smtClean="0">
+                            <a:latin typeface="Cambria Math" panose="02040503050406030204" pitchFamily="18" charset="0"/>
+                          </a:rPr>
+                          <m:t>+</m:t>
+                        </m:r>
+                        <m:sSup>
+                          <m:sSupPr>
+                            <m:ctrlPr>
+                              <a:rPr lang="en-US" b="0" i="1" smtClean="0">
+                                <a:latin typeface="Cambria Math" panose="02040503050406030204" pitchFamily="18" charset="0"/>
+                              </a:rPr>
+                            </m:ctrlPr>
+                          </m:sSupPr>
+                          <m:e>
+                            <m:acc>
+                              <m:accPr>
+                                <m:chr m:val="̅"/>
+                                <m:ctrlPr>
+                                  <a:rPr lang="en-US" i="1">
+                                    <a:latin typeface="Cambria Math" panose="02040503050406030204" pitchFamily="18" charset="0"/>
+                                  </a:rPr>
+                                </m:ctrlPr>
+                              </m:accPr>
+                              <m:e>
+                                <m:r>
+                                  <a:rPr lang="en-US" i="1">
+                                    <a:latin typeface="Cambria Math" panose="02040503050406030204" pitchFamily="18" charset="0"/>
+                                  </a:rPr>
+                                  <m:t>𝑥</m:t>
+                                </m:r>
+                              </m:e>
+                            </m:acc>
+                          </m:e>
+                          <m:sup>
+                            <m:r>
+                              <a:rPr lang="en-US" b="0" i="1" smtClean="0">
+                                <a:latin typeface="Cambria Math" panose="02040503050406030204" pitchFamily="18" charset="0"/>
+                              </a:rPr>
+                              <m:t>2</m:t>
+                            </m:r>
+                          </m:sup>
+                        </m:sSup>
+                        <m:r>
+                          <a:rPr lang="en-US" b="0" i="1" smtClean="0">
+                            <a:latin typeface="Cambria Math" panose="02040503050406030204" pitchFamily="18" charset="0"/>
+                          </a:rPr>
+                          <m:t>)</m:t>
+                        </m:r>
+                      </m:e>
+                    </m:nary>
+                    <m:r>
+                      <a:rPr lang="en-US" b="0" i="1" smtClean="0">
+                        <a:latin typeface="Cambria Math" panose="02040503050406030204" pitchFamily="18" charset="0"/>
+                      </a:rPr>
+                      <m:t>=</m:t>
+                    </m:r>
+                    <m:d>
+                      <m:dPr>
+                        <m:begChr m:val="⟨"/>
+                        <m:endChr m:val="⟩"/>
+                        <m:ctrlPr>
+                          <a:rPr lang="en-US" i="1">
+                            <a:latin typeface="Cambria Math" panose="02040503050406030204" pitchFamily="18" charset="0"/>
+                          </a:rPr>
+                        </m:ctrlPr>
+                      </m:dPr>
+                      <m:e>
+                        <m:sSubSup>
+                          <m:sSubSupPr>
+                            <m:ctrlPr>
+                              <a:rPr lang="en-US" i="1">
+                                <a:latin typeface="Cambria Math" panose="02040503050406030204" pitchFamily="18" charset="0"/>
+                              </a:rPr>
+                            </m:ctrlPr>
+                          </m:sSubSupPr>
+                          <m:e>
+                            <m:r>
+                              <a:rPr lang="en-US" i="1">
+                                <a:latin typeface="Cambria Math" panose="02040503050406030204" pitchFamily="18" charset="0"/>
+                              </a:rPr>
+                              <m:t>𝑥</m:t>
+                            </m:r>
+                          </m:e>
+                          <m:sub>
+                            <m:r>
+                              <a:rPr lang="en-US" i="1">
+                                <a:latin typeface="Cambria Math" panose="02040503050406030204" pitchFamily="18" charset="0"/>
+                              </a:rPr>
+                              <m:t>𝑖</m:t>
+                            </m:r>
+                          </m:sub>
+                          <m:sup>
+                            <m:r>
+                              <a:rPr lang="en-US" i="1">
+                                <a:latin typeface="Cambria Math" panose="02040503050406030204" pitchFamily="18" charset="0"/>
+                              </a:rPr>
+                              <m:t>2</m:t>
+                            </m:r>
+                          </m:sup>
+                        </m:sSubSup>
+                      </m:e>
+                    </m:d>
+                    <m:r>
+                      <a:rPr lang="en-US" b="0" i="1" smtClean="0">
+                        <a:latin typeface="Cambria Math" panose="02040503050406030204" pitchFamily="18" charset="0"/>
+                      </a:rPr>
+                      <m:t>−2</m:t>
+                    </m:r>
                     <m:acc>
                       <m:accPr>
                         <m:chr m:val="̅"/>
                         <m:ctrlPr>
-                          <a:rPr lang="en-US" b="0" i="1" smtClean="0">
+                          <a:rPr lang="en-US" i="1">
                             <a:latin typeface="Cambria Math" panose="02040503050406030204" pitchFamily="18" charset="0"/>
                           </a:rPr>
                         </m:ctrlPr>
                       </m:accPr>
                       <m:e>
                         <m:r>
-                          <a:rPr lang="en-US" b="0" i="1" smtClean="0">
-                            <a:latin typeface="Cambria Math" panose="02040503050406030204" pitchFamily="18" charset="0"/>
-                          </a:rPr>
-                          <m:t>𝑥𝑦</m:t>
+                          <a:rPr lang="en-US" i="1">
+                            <a:latin typeface="Cambria Math" panose="02040503050406030204" pitchFamily="18" charset="0"/>
+                          </a:rPr>
+                          <m:t>𝑥</m:t>
                         </m:r>
                       </m:e>
                     </m:acc>
+                    <m:d>
+                      <m:dPr>
+                        <m:begChr m:val="⟨"/>
+                        <m:endChr m:val="⟩"/>
+                        <m:ctrlPr>
+                          <a:rPr lang="en-US" i="1">
+                            <a:latin typeface="Cambria Math" panose="02040503050406030204" pitchFamily="18" charset="0"/>
+                          </a:rPr>
+                        </m:ctrlPr>
+                      </m:dPr>
+                      <m:e>
+                        <m:sSub>
+                          <m:sSubPr>
+                            <m:ctrlPr>
+                              <a:rPr lang="en-US" i="1">
+                                <a:latin typeface="Cambria Math" panose="02040503050406030204" pitchFamily="18" charset="0"/>
+                              </a:rPr>
+                            </m:ctrlPr>
+                          </m:sSubPr>
+                          <m:e>
+                            <m:r>
+                              <a:rPr lang="en-US" i="1">
+                                <a:latin typeface="Cambria Math" panose="02040503050406030204" pitchFamily="18" charset="0"/>
+                              </a:rPr>
+                              <m:t>𝑥</m:t>
+                            </m:r>
+                          </m:e>
+                          <m:sub>
+                            <m:r>
+                              <a:rPr lang="en-US" i="1">
+                                <a:latin typeface="Cambria Math" panose="02040503050406030204" pitchFamily="18" charset="0"/>
+                              </a:rPr>
+                              <m:t>𝑖</m:t>
+                            </m:r>
+                          </m:sub>
+                        </m:sSub>
+                      </m:e>
+                    </m:d>
+                    <m:r>
+                      <a:rPr lang="en-US" b="0" i="1" smtClean="0">
+                        <a:latin typeface="Cambria Math" panose="02040503050406030204" pitchFamily="18" charset="0"/>
+                      </a:rPr>
+                      <m:t>+</m:t>
+                    </m:r>
+                    <m:sSup>
+                      <m:sSupPr>
+                        <m:ctrlPr>
+                          <a:rPr lang="en-US" b="0" i="1" smtClean="0">
+                            <a:latin typeface="Cambria Math" panose="02040503050406030204" pitchFamily="18" charset="0"/>
+                          </a:rPr>
+                        </m:ctrlPr>
+                      </m:sSupPr>
+                      <m:e>
+                        <m:acc>
+                          <m:accPr>
+                            <m:chr m:val="̅"/>
+                            <m:ctrlPr>
+                              <a:rPr lang="en-US" i="1">
+                                <a:latin typeface="Cambria Math" panose="02040503050406030204" pitchFamily="18" charset="0"/>
+                              </a:rPr>
+                            </m:ctrlPr>
+                          </m:accPr>
+                          <m:e>
+                            <m:r>
+                              <a:rPr lang="en-US" i="1">
+                                <a:latin typeface="Cambria Math" panose="02040503050406030204" pitchFamily="18" charset="0"/>
+                              </a:rPr>
+                              <m:t>𝑥</m:t>
+                            </m:r>
+                          </m:e>
+                        </m:acc>
+                      </m:e>
+                      <m:sup>
+                        <m:r>
+                          <a:rPr lang="en-US" b="0" i="1" smtClean="0">
+                            <a:latin typeface="Cambria Math" panose="02040503050406030204" pitchFamily="18" charset="0"/>
+                          </a:rPr>
+                          <m:t>2</m:t>
+                        </m:r>
+                      </m:sup>
+                    </m:sSup>
                   </m:oMath>
                 </a14:m>
+                <a:endParaRPr lang="en-US" b="0" dirty="0"/>
+              </a:p>
+              <a:p>
+                <a:pPr lvl="1"/>
+                <a:r>
+                  <a:rPr lang="en-US" dirty="0"/>
+                  <a:t>Recall </a:t>
+                </a:r>
+                <a14:m>
+                  <m:oMath xmlns:m="http://schemas.openxmlformats.org/officeDocument/2006/math">
+                    <m:acc>
+                      <m:accPr>
+                        <m:chr m:val="̅"/>
+                        <m:ctrlPr>
+                          <a:rPr lang="en-US" i="1">
+                            <a:latin typeface="Cambria Math" panose="02040503050406030204" pitchFamily="18" charset="0"/>
+                          </a:rPr>
+                        </m:ctrlPr>
+                      </m:accPr>
+                      <m:e>
+                        <m:r>
+                          <a:rPr lang="en-US" i="1">
+                            <a:latin typeface="Cambria Math" panose="02040503050406030204" pitchFamily="18" charset="0"/>
+                          </a:rPr>
+                          <m:t>𝑥</m:t>
+                        </m:r>
+                      </m:e>
+                    </m:acc>
+                    <m:r>
+                      <a:rPr lang="en-US" i="1">
+                        <a:latin typeface="Cambria Math" panose="02040503050406030204" pitchFamily="18" charset="0"/>
+                      </a:rPr>
+                      <m:t>=</m:t>
+                    </m:r>
+                  </m:oMath>
+                </a14:m>
+                <a:r>
+                  <a:rPr lang="en-US" dirty="0"/>
+                  <a:t> </a:t>
+                </a:r>
+                <a14:m>
+                  <m:oMath xmlns:m="http://schemas.openxmlformats.org/officeDocument/2006/math">
+                    <m:d>
+                      <m:dPr>
+                        <m:begChr m:val="⟨"/>
+                        <m:endChr m:val="⟩"/>
+                        <m:ctrlPr>
+                          <a:rPr lang="en-US" i="1">
+                            <a:latin typeface="Cambria Math" panose="02040503050406030204" pitchFamily="18" charset="0"/>
+                          </a:rPr>
+                        </m:ctrlPr>
+                      </m:dPr>
+                      <m:e>
+                        <m:sSub>
+                          <m:sSubPr>
+                            <m:ctrlPr>
+                              <a:rPr lang="en-US" i="1">
+                                <a:latin typeface="Cambria Math" panose="02040503050406030204" pitchFamily="18" charset="0"/>
+                              </a:rPr>
+                            </m:ctrlPr>
+                          </m:sSubPr>
+                          <m:e>
+                            <m:r>
+                              <a:rPr lang="en-US" i="1">
+                                <a:latin typeface="Cambria Math" panose="02040503050406030204" pitchFamily="18" charset="0"/>
+                              </a:rPr>
+                              <m:t>𝑥</m:t>
+                            </m:r>
+                          </m:e>
+                          <m:sub>
+                            <m:r>
+                              <a:rPr lang="en-US" i="1">
+                                <a:latin typeface="Cambria Math" panose="02040503050406030204" pitchFamily="18" charset="0"/>
+                              </a:rPr>
+                              <m:t>𝑖</m:t>
+                            </m:r>
+                          </m:sub>
+                        </m:sSub>
+                      </m:e>
+                    </m:d>
+                  </m:oMath>
+                </a14:m>
+                <a:endParaRPr lang="en-US" dirty="0"/>
+              </a:p>
+              <a:p>
+                <a:pPr lvl="1"/>
+                <a:r>
+                  <a:rPr lang="en-US" dirty="0"/>
+                  <a:t>Therefore, </a:t>
+                </a:r>
+                <a14:m>
+                  <m:oMath xmlns:m="http://schemas.openxmlformats.org/officeDocument/2006/math">
+                    <m:sSub>
+                      <m:sSubPr>
+                        <m:ctrlPr>
+                          <a:rPr lang="en-US" i="1">
+                            <a:latin typeface="Cambria Math" panose="02040503050406030204" pitchFamily="18" charset="0"/>
+                          </a:rPr>
+                        </m:ctrlPr>
+                      </m:sSubPr>
+                      <m:e>
+                        <m:r>
+                          <a:rPr lang="en-US" i="1">
+                            <a:latin typeface="Cambria Math" panose="02040503050406030204" pitchFamily="18" charset="0"/>
+                          </a:rPr>
+                          <m:t>𝑠</m:t>
+                        </m:r>
+                      </m:e>
+                      <m:sub>
+                        <m:r>
+                          <a:rPr lang="en-US" i="1">
+                            <a:latin typeface="Cambria Math" panose="02040503050406030204" pitchFamily="18" charset="0"/>
+                          </a:rPr>
+                          <m:t>𝑥𝑥</m:t>
+                        </m:r>
+                      </m:sub>
+                    </m:sSub>
+                    <m:r>
+                      <a:rPr lang="en-US" b="0" i="1" smtClean="0">
+                        <a:latin typeface="Cambria Math" panose="02040503050406030204" pitchFamily="18" charset="0"/>
+                      </a:rPr>
+                      <m:t>=</m:t>
+                    </m:r>
+                    <m:d>
+                      <m:dPr>
+                        <m:begChr m:val="⟨"/>
+                        <m:endChr m:val="⟩"/>
+                        <m:ctrlPr>
+                          <a:rPr lang="en-US" i="1">
+                            <a:latin typeface="Cambria Math" panose="02040503050406030204" pitchFamily="18" charset="0"/>
+                          </a:rPr>
+                        </m:ctrlPr>
+                      </m:dPr>
+                      <m:e>
+                        <m:sSubSup>
+                          <m:sSubSupPr>
+                            <m:ctrlPr>
+                              <a:rPr lang="en-US" i="1">
+                                <a:latin typeface="Cambria Math" panose="02040503050406030204" pitchFamily="18" charset="0"/>
+                              </a:rPr>
+                            </m:ctrlPr>
+                          </m:sSubSupPr>
+                          <m:e>
+                            <m:r>
+                              <a:rPr lang="en-US" i="1">
+                                <a:latin typeface="Cambria Math" panose="02040503050406030204" pitchFamily="18" charset="0"/>
+                              </a:rPr>
+                              <m:t>𝑥</m:t>
+                            </m:r>
+                          </m:e>
+                          <m:sub>
+                            <m:r>
+                              <a:rPr lang="en-US" i="1">
+                                <a:latin typeface="Cambria Math" panose="02040503050406030204" pitchFamily="18" charset="0"/>
+                              </a:rPr>
+                              <m:t>𝑖</m:t>
+                            </m:r>
+                          </m:sub>
+                          <m:sup>
+                            <m:r>
+                              <a:rPr lang="en-US" i="1">
+                                <a:latin typeface="Cambria Math" panose="02040503050406030204" pitchFamily="18" charset="0"/>
+                              </a:rPr>
+                              <m:t>2</m:t>
+                            </m:r>
+                          </m:sup>
+                        </m:sSubSup>
+                      </m:e>
+                    </m:d>
+                    <m:r>
+                      <a:rPr lang="en-US" b="0" i="1" smtClean="0">
+                        <a:latin typeface="Cambria Math" panose="02040503050406030204" pitchFamily="18" charset="0"/>
+                      </a:rPr>
+                      <m:t>−</m:t>
+                    </m:r>
+                    <m:sSup>
+                      <m:sSupPr>
+                        <m:ctrlPr>
+                          <a:rPr lang="en-US" i="1">
+                            <a:latin typeface="Cambria Math" panose="02040503050406030204" pitchFamily="18" charset="0"/>
+                          </a:rPr>
+                        </m:ctrlPr>
+                      </m:sSupPr>
+                      <m:e>
+                        <m:d>
+                          <m:dPr>
+                            <m:begChr m:val="⟨"/>
+                            <m:endChr m:val="⟩"/>
+                            <m:ctrlPr>
+                              <a:rPr lang="en-US" i="1">
+                                <a:latin typeface="Cambria Math" panose="02040503050406030204" pitchFamily="18" charset="0"/>
+                              </a:rPr>
+                            </m:ctrlPr>
+                          </m:dPr>
+                          <m:e>
+                            <m:sSub>
+                              <m:sSubPr>
+                                <m:ctrlPr>
+                                  <a:rPr lang="en-US" i="1">
+                                    <a:latin typeface="Cambria Math" panose="02040503050406030204" pitchFamily="18" charset="0"/>
+                                  </a:rPr>
+                                </m:ctrlPr>
+                              </m:sSubPr>
+                              <m:e>
+                                <m:r>
+                                  <a:rPr lang="en-US" i="1">
+                                    <a:latin typeface="Cambria Math" panose="02040503050406030204" pitchFamily="18" charset="0"/>
+                                  </a:rPr>
+                                  <m:t>𝑥</m:t>
+                                </m:r>
+                              </m:e>
+                              <m:sub>
+                                <m:r>
+                                  <a:rPr lang="en-US" i="1">
+                                    <a:latin typeface="Cambria Math" panose="02040503050406030204" pitchFamily="18" charset="0"/>
+                                  </a:rPr>
+                                  <m:t>𝑖</m:t>
+                                </m:r>
+                              </m:sub>
+                            </m:sSub>
+                          </m:e>
+                        </m:d>
+                      </m:e>
+                      <m:sup>
+                        <m:r>
+                          <a:rPr lang="en-US" i="1">
+                            <a:latin typeface="Cambria Math" panose="02040503050406030204" pitchFamily="18" charset="0"/>
+                          </a:rPr>
+                          <m:t>2</m:t>
+                        </m:r>
+                      </m:sup>
+                    </m:sSup>
+                  </m:oMath>
+                </a14:m>
+                <a:endParaRPr lang="en-US" dirty="0"/>
+              </a:p>
+              <a:p>
+                <a:pPr lvl="1"/>
+                <a:r>
+                  <a:rPr lang="en-US" dirty="0"/>
+                  <a:t>Other relations </a:t>
+                </a:r>
+                <a14:m>
+                  <m:oMath xmlns:m="http://schemas.openxmlformats.org/officeDocument/2006/math">
+                    <m:sSub>
+                      <m:sSubPr>
+                        <m:ctrlPr>
+                          <a:rPr lang="en-US" i="1">
+                            <a:latin typeface="Cambria Math" panose="02040503050406030204" pitchFamily="18" charset="0"/>
+                          </a:rPr>
+                        </m:ctrlPr>
+                      </m:sSubPr>
+                      <m:e>
+                        <m:r>
+                          <a:rPr lang="en-US" i="1">
+                            <a:latin typeface="Cambria Math" panose="02040503050406030204" pitchFamily="18" charset="0"/>
+                          </a:rPr>
+                          <m:t>𝑠</m:t>
+                        </m:r>
+                      </m:e>
+                      <m:sub>
+                        <m:r>
+                          <a:rPr lang="en-US" i="1">
+                            <a:latin typeface="Cambria Math" panose="02040503050406030204" pitchFamily="18" charset="0"/>
+                          </a:rPr>
+                          <m:t>𝑦𝑦</m:t>
+                        </m:r>
+                      </m:sub>
+                    </m:sSub>
+                    <m:r>
+                      <a:rPr lang="en-US" i="1">
+                        <a:latin typeface="Cambria Math" panose="02040503050406030204" pitchFamily="18" charset="0"/>
+                      </a:rPr>
+                      <m:t>=</m:t>
+                    </m:r>
+                    <m:d>
+                      <m:dPr>
+                        <m:begChr m:val="⟨"/>
+                        <m:endChr m:val="⟩"/>
+                        <m:ctrlPr>
+                          <a:rPr lang="en-US" i="1">
+                            <a:latin typeface="Cambria Math" panose="02040503050406030204" pitchFamily="18" charset="0"/>
+                          </a:rPr>
+                        </m:ctrlPr>
+                      </m:dPr>
+                      <m:e>
+                        <m:sSubSup>
+                          <m:sSubSupPr>
+                            <m:ctrlPr>
+                              <a:rPr lang="en-US" i="1">
+                                <a:latin typeface="Cambria Math" panose="02040503050406030204" pitchFamily="18" charset="0"/>
+                              </a:rPr>
+                            </m:ctrlPr>
+                          </m:sSubSupPr>
+                          <m:e>
+                            <m:r>
+                              <a:rPr lang="en-US" i="1">
+                                <a:latin typeface="Cambria Math" panose="02040503050406030204" pitchFamily="18" charset="0"/>
+                              </a:rPr>
+                              <m:t>𝑦</m:t>
+                            </m:r>
+                          </m:e>
+                          <m:sub>
+                            <m:r>
+                              <a:rPr lang="en-US" i="1">
+                                <a:latin typeface="Cambria Math" panose="02040503050406030204" pitchFamily="18" charset="0"/>
+                              </a:rPr>
+                              <m:t>𝑖</m:t>
+                            </m:r>
+                          </m:sub>
+                          <m:sup>
+                            <m:r>
+                              <a:rPr lang="en-US" i="1">
+                                <a:latin typeface="Cambria Math" panose="02040503050406030204" pitchFamily="18" charset="0"/>
+                              </a:rPr>
+                              <m:t>2</m:t>
+                            </m:r>
+                          </m:sup>
+                        </m:sSubSup>
+                      </m:e>
+                    </m:d>
+                    <m:r>
+                      <a:rPr lang="en-US" i="1">
+                        <a:latin typeface="Cambria Math" panose="02040503050406030204" pitchFamily="18" charset="0"/>
+                      </a:rPr>
+                      <m:t>−</m:t>
+                    </m:r>
+                    <m:sSup>
+                      <m:sSupPr>
+                        <m:ctrlPr>
+                          <a:rPr lang="en-US" i="1">
+                            <a:latin typeface="Cambria Math" panose="02040503050406030204" pitchFamily="18" charset="0"/>
+                          </a:rPr>
+                        </m:ctrlPr>
+                      </m:sSupPr>
+                      <m:e>
+                        <m:d>
+                          <m:dPr>
+                            <m:begChr m:val="⟨"/>
+                            <m:endChr m:val="⟩"/>
+                            <m:ctrlPr>
+                              <a:rPr lang="en-US" i="1">
+                                <a:latin typeface="Cambria Math" panose="02040503050406030204" pitchFamily="18" charset="0"/>
+                              </a:rPr>
+                            </m:ctrlPr>
+                          </m:dPr>
+                          <m:e>
+                            <m:sSub>
+                              <m:sSubPr>
+                                <m:ctrlPr>
+                                  <a:rPr lang="en-US" i="1">
+                                    <a:latin typeface="Cambria Math" panose="02040503050406030204" pitchFamily="18" charset="0"/>
+                                  </a:rPr>
+                                </m:ctrlPr>
+                              </m:sSubPr>
+                              <m:e>
+                                <m:r>
+                                  <a:rPr lang="en-US" i="1">
+                                    <a:latin typeface="Cambria Math" panose="02040503050406030204" pitchFamily="18" charset="0"/>
+                                  </a:rPr>
+                                  <m:t>𝑦</m:t>
+                                </m:r>
+                              </m:e>
+                              <m:sub>
+                                <m:r>
+                                  <a:rPr lang="en-US" i="1">
+                                    <a:latin typeface="Cambria Math" panose="02040503050406030204" pitchFamily="18" charset="0"/>
+                                  </a:rPr>
+                                  <m:t>𝑖</m:t>
+                                </m:r>
+                              </m:sub>
+                            </m:sSub>
+                          </m:e>
+                        </m:d>
+                      </m:e>
+                      <m:sup>
+                        <m:r>
+                          <a:rPr lang="en-US" i="1">
+                            <a:latin typeface="Cambria Math" panose="02040503050406030204" pitchFamily="18" charset="0"/>
+                          </a:rPr>
+                          <m:t>2</m:t>
+                        </m:r>
+                      </m:sup>
+                    </m:sSup>
+                  </m:oMath>
+                </a14:m>
+                <a:r>
+                  <a:rPr lang="en-US" dirty="0"/>
+                  <a:t> and </a:t>
+                </a:r>
+                <a14:m>
+                  <m:oMath xmlns:m="http://schemas.openxmlformats.org/officeDocument/2006/math">
+                    <m:sSub>
+                      <m:sSubPr>
+                        <m:ctrlPr>
+                          <a:rPr lang="en-US" i="1">
+                            <a:latin typeface="Cambria Math" panose="02040503050406030204" pitchFamily="18" charset="0"/>
+                          </a:rPr>
+                        </m:ctrlPr>
+                      </m:sSubPr>
+                      <m:e>
+                        <m:r>
+                          <a:rPr lang="en-US" i="1">
+                            <a:latin typeface="Cambria Math" panose="02040503050406030204" pitchFamily="18" charset="0"/>
+                          </a:rPr>
+                          <m:t>𝑠</m:t>
+                        </m:r>
+                      </m:e>
+                      <m:sub>
+                        <m:r>
+                          <a:rPr lang="en-US" i="1">
+                            <a:latin typeface="Cambria Math" panose="02040503050406030204" pitchFamily="18" charset="0"/>
+                          </a:rPr>
+                          <m:t>𝑥</m:t>
+                        </m:r>
+                        <m:r>
+                          <a:rPr lang="en-US" i="1">
+                            <a:latin typeface="Cambria Math" panose="02040503050406030204" pitchFamily="18" charset="0"/>
+                          </a:rPr>
+                          <m:t>𝑦</m:t>
+                        </m:r>
+                      </m:sub>
+                    </m:sSub>
+                    <m:r>
+                      <a:rPr lang="en-US" i="1">
+                        <a:latin typeface="Cambria Math" panose="02040503050406030204" pitchFamily="18" charset="0"/>
+                      </a:rPr>
+                      <m:t>=</m:t>
+                    </m:r>
+                    <m:d>
+                      <m:dPr>
+                        <m:begChr m:val="⟨"/>
+                        <m:endChr m:val="⟩"/>
+                        <m:ctrlPr>
+                          <a:rPr lang="en-US" i="1">
+                            <a:latin typeface="Cambria Math" panose="02040503050406030204" pitchFamily="18" charset="0"/>
+                          </a:rPr>
+                        </m:ctrlPr>
+                      </m:dPr>
+                      <m:e>
+                        <m:sSub>
+                          <m:sSubPr>
+                            <m:ctrlPr>
+                              <a:rPr lang="en-US" i="1">
+                                <a:latin typeface="Cambria Math" panose="02040503050406030204" pitchFamily="18" charset="0"/>
+                              </a:rPr>
+                            </m:ctrlPr>
+                          </m:sSubPr>
+                          <m:e>
+                            <m:r>
+                              <a:rPr lang="en-US" i="1">
+                                <a:latin typeface="Cambria Math" panose="02040503050406030204" pitchFamily="18" charset="0"/>
+                              </a:rPr>
+                              <m:t>𝑥</m:t>
+                            </m:r>
+                          </m:e>
+                          <m:sub>
+                            <m:r>
+                              <a:rPr lang="en-US" i="1">
+                                <a:latin typeface="Cambria Math" panose="02040503050406030204" pitchFamily="18" charset="0"/>
+                              </a:rPr>
+                              <m:t>𝑖</m:t>
+                            </m:r>
+                          </m:sub>
+                        </m:sSub>
+                        <m:sSub>
+                          <m:sSubPr>
+                            <m:ctrlPr>
+                              <a:rPr lang="en-US" i="1">
+                                <a:latin typeface="Cambria Math" panose="02040503050406030204" pitchFamily="18" charset="0"/>
+                              </a:rPr>
+                            </m:ctrlPr>
+                          </m:sSubPr>
+                          <m:e>
+                            <m:r>
+                              <a:rPr lang="en-US" i="1">
+                                <a:latin typeface="Cambria Math" panose="02040503050406030204" pitchFamily="18" charset="0"/>
+                              </a:rPr>
+                              <m:t>𝑦</m:t>
+                            </m:r>
+                          </m:e>
+                          <m:sub>
+                            <m:r>
+                              <a:rPr lang="en-US" i="1">
+                                <a:latin typeface="Cambria Math" panose="02040503050406030204" pitchFamily="18" charset="0"/>
+                              </a:rPr>
+                              <m:t>𝑖</m:t>
+                            </m:r>
+                          </m:sub>
+                        </m:sSub>
+                      </m:e>
+                    </m:d>
+                    <m:r>
+                      <a:rPr lang="en-US" i="1">
+                        <a:latin typeface="Cambria Math" panose="02040503050406030204" pitchFamily="18" charset="0"/>
+                      </a:rPr>
+                      <m:t>−</m:t>
+                    </m:r>
+                    <m:d>
+                      <m:dPr>
+                        <m:begChr m:val="⟨"/>
+                        <m:endChr m:val="⟩"/>
+                        <m:ctrlPr>
+                          <a:rPr lang="en-US" i="1">
+                            <a:latin typeface="Cambria Math" panose="02040503050406030204" pitchFamily="18" charset="0"/>
+                          </a:rPr>
+                        </m:ctrlPr>
+                      </m:dPr>
+                      <m:e>
+                        <m:sSub>
+                          <m:sSubPr>
+                            <m:ctrlPr>
+                              <a:rPr lang="en-US" i="1">
+                                <a:latin typeface="Cambria Math" panose="02040503050406030204" pitchFamily="18" charset="0"/>
+                              </a:rPr>
+                            </m:ctrlPr>
+                          </m:sSubPr>
+                          <m:e>
+                            <m:r>
+                              <a:rPr lang="en-US" i="1">
+                                <a:latin typeface="Cambria Math" panose="02040503050406030204" pitchFamily="18" charset="0"/>
+                              </a:rPr>
+                              <m:t>𝑥</m:t>
+                            </m:r>
+                          </m:e>
+                          <m:sub>
+                            <m:r>
+                              <a:rPr lang="en-US" i="1">
+                                <a:latin typeface="Cambria Math" panose="02040503050406030204" pitchFamily="18" charset="0"/>
+                              </a:rPr>
+                              <m:t>𝑖</m:t>
+                            </m:r>
+                          </m:sub>
+                        </m:sSub>
+                      </m:e>
+                    </m:d>
+                    <m:d>
+                      <m:dPr>
+                        <m:begChr m:val="⟨"/>
+                        <m:endChr m:val="⟩"/>
+                        <m:ctrlPr>
+                          <a:rPr lang="en-US" i="1">
+                            <a:latin typeface="Cambria Math" panose="02040503050406030204" pitchFamily="18" charset="0"/>
+                          </a:rPr>
+                        </m:ctrlPr>
+                      </m:dPr>
+                      <m:e>
+                        <m:sSub>
+                          <m:sSubPr>
+                            <m:ctrlPr>
+                              <a:rPr lang="en-US" i="1">
+                                <a:latin typeface="Cambria Math" panose="02040503050406030204" pitchFamily="18" charset="0"/>
+                              </a:rPr>
+                            </m:ctrlPr>
+                          </m:sSubPr>
+                          <m:e>
+                            <m:r>
+                              <a:rPr lang="en-US" i="1">
+                                <a:latin typeface="Cambria Math" panose="02040503050406030204" pitchFamily="18" charset="0"/>
+                              </a:rPr>
+                              <m:t>𝑦</m:t>
+                            </m:r>
+                          </m:e>
+                          <m:sub>
+                            <m:r>
+                              <a:rPr lang="en-US" i="1">
+                                <a:latin typeface="Cambria Math" panose="02040503050406030204" pitchFamily="18" charset="0"/>
+                              </a:rPr>
+                              <m:t>𝑖</m:t>
+                            </m:r>
+                          </m:sub>
+                        </m:sSub>
+                      </m:e>
+                    </m:d>
+                  </m:oMath>
+                </a14:m>
+                <a:r>
+                  <a:rPr lang="en-US" dirty="0"/>
+                  <a:t> proved similarly</a:t>
+                </a:r>
+              </a:p>
+              <a:p>
+                <a:pPr lvl="1"/>
                 <a:endParaRPr lang="en-US" dirty="0"/>
               </a:p>
               <a:p>
@@ -14907,7 +16967,7 @@
             </p:txBody>
           </p:sp>
         </mc:Choice>
-        <mc:Fallback xmlns="">
+        <mc:Fallback>
           <p:sp>
             <p:nvSpPr>
               <p:cNvPr id="3" name="Content Placeholder 2"/>
@@ -14922,7 +16982,7 @@
               <a:blipFill>
                 <a:blip r:embed="rId2"/>
                 <a:stretch>
-                  <a:fillRect l="-1455" t="-10704"/>
+                  <a:fillRect l="-1455" t="-1549"/>
                 </a:stretch>
               </a:blipFill>
             </p:spPr>
@@ -14958,7 +17018,7 @@
           <a:p>
             <a:fld id="{629637A9-119A-49DA-BD12-AAC58B377D80}" type="slidenum">
               <a:rPr lang="en-US" smtClean="0"/>
-              <a:t>26</a:t>
+              <a:t>27</a:t>
             </a:fld>
             <a:endParaRPr lang="en-US" dirty="0"/>
           </a:p>
@@ -14977,7 +17037,7 @@
 </p:sld>
 </file>
 
-<file path=ppt/slides/slide27.xml><?xml version="1.0" encoding="utf-8"?>
+<file path=ppt/slides/slide28.xml><?xml version="1.0" encoding="utf-8"?>
 <p:sld xmlns:a="http://schemas.openxmlformats.org/drawingml/2006/main" xmlns:r="http://schemas.openxmlformats.org/officeDocument/2006/relationships" xmlns:p="http://schemas.openxmlformats.org/presentationml/2006/main">
   <p:cSld>
     <p:spTree>
@@ -15085,7 +17145,7 @@
           <a:p>
             <a:fld id="{629637A9-119A-49DA-BD12-AAC58B377D80}" type="slidenum">
               <a:rPr lang="en-US" smtClean="0"/>
-              <a:t>27</a:t>
+              <a:t>28</a:t>
             </a:fld>
             <a:endParaRPr lang="en-US" dirty="0"/>
           </a:p>
@@ -16726,7 +18786,353 @@
 </p:sld>
 </file>
 
-<file path=ppt/slides/slide28.xml><?xml version="1.0" encoding="utf-8"?>
+<file path=ppt/slides/slide29.xml><?xml version="1.0" encoding="utf-8"?>
+<p:sld xmlns:a="http://schemas.openxmlformats.org/drawingml/2006/main" xmlns:r="http://schemas.openxmlformats.org/officeDocument/2006/relationships" xmlns:p="http://schemas.openxmlformats.org/presentationml/2006/main">
+  <p:cSld>
+    <p:spTree>
+      <p:nvGrpSpPr>
+        <p:cNvPr id="1" name=""/>
+        <p:cNvGrpSpPr/>
+        <p:nvPr/>
+      </p:nvGrpSpPr>
+      <p:grpSpPr>
+        <a:xfrm>
+          <a:off x="0" y="0"/>
+          <a:ext cx="0" cy="0"/>
+          <a:chOff x="0" y="0"/>
+          <a:chExt cx="0" cy="0"/>
+        </a:xfrm>
+      </p:grpSpPr>
+      <p:sp>
+        <p:nvSpPr>
+          <p:cNvPr id="2" name="Title 1"/>
+          <p:cNvSpPr>
+            <a:spLocks noGrp="1"/>
+          </p:cNvSpPr>
+          <p:nvPr>
+            <p:ph type="title"/>
+          </p:nvPr>
+        </p:nvSpPr>
+        <p:spPr/>
+        <p:txBody>
+          <a:bodyPr/>
+          <a:lstStyle/>
+          <a:p>
+            <a:r>
+              <a:rPr lang="en-US" dirty="0"/>
+              <a:t>Outline</a:t>
+            </a:r>
+          </a:p>
+        </p:txBody>
+      </p:sp>
+      <p:sp>
+        <p:nvSpPr>
+          <p:cNvPr id="3" name="Content Placeholder 2"/>
+          <p:cNvSpPr>
+            <a:spLocks noGrp="1"/>
+          </p:cNvSpPr>
+          <p:nvPr>
+            <p:ph idx="1"/>
+          </p:nvPr>
+        </p:nvSpPr>
+        <p:spPr/>
+        <p:txBody>
+          <a:bodyPr/>
+          <a:lstStyle/>
+          <a:p>
+            <a:r>
+              <a:rPr lang="en-US" dirty="0"/>
+              <a:t>Motivating Example:  Predicting the mpg of a car</a:t>
+            </a:r>
+          </a:p>
+          <a:p>
+            <a:r>
+              <a:rPr lang="en-US" dirty="0"/>
+              <a:t>Linear Model</a:t>
+            </a:r>
+          </a:p>
+          <a:p>
+            <a:r>
+              <a:rPr lang="en-US" dirty="0"/>
+              <a:t>Least Squares Fit Problem</a:t>
+            </a:r>
+          </a:p>
+          <a:p>
+            <a:r>
+              <a:rPr lang="en-US" dirty="0"/>
+              <a:t>Sample Mean and Variance</a:t>
+            </a:r>
+          </a:p>
+          <a:p>
+            <a:r>
+              <a:rPr lang="en-US" dirty="0"/>
+              <a:t>LS Fit Solution</a:t>
+            </a:r>
+          </a:p>
+          <a:p>
+            <a:r>
+              <a:rPr lang="en-US" dirty="0"/>
+              <a:t>Assessing Goodness of Fit</a:t>
+            </a:r>
+          </a:p>
+        </p:txBody>
+      </p:sp>
+      <p:sp>
+        <p:nvSpPr>
+          <p:cNvPr id="4" name="Slide Number Placeholder 3"/>
+          <p:cNvSpPr>
+            <a:spLocks noGrp="1"/>
+          </p:cNvSpPr>
+          <p:nvPr>
+            <p:ph type="sldNum" sz="quarter" idx="12"/>
+          </p:nvPr>
+        </p:nvSpPr>
+        <p:spPr/>
+        <p:txBody>
+          <a:bodyPr/>
+          <a:lstStyle/>
+          <a:p>
+            <a:fld id="{629637A9-119A-49DA-BD12-AAC58B377D80}" type="slidenum">
+              <a:rPr lang="en-US" smtClean="0"/>
+              <a:t>29</a:t>
+            </a:fld>
+            <a:endParaRPr lang="en-US" dirty="0"/>
+          </a:p>
+        </p:txBody>
+      </p:sp>
+      <p:sp>
+        <p:nvSpPr>
+          <p:cNvPr id="5" name="Arrow: Right 4"/>
+          <p:cNvSpPr/>
+          <p:nvPr/>
+        </p:nvSpPr>
+        <p:spPr>
+          <a:xfrm>
+            <a:off x="352255" y="3322792"/>
+            <a:ext cx="938784" cy="484632"/>
+          </a:xfrm>
+          <a:prstGeom prst="rightArrow">
+            <a:avLst/>
+          </a:prstGeom>
+          <a:solidFill>
+            <a:schemeClr val="accent1">
+              <a:lumMod val="40000"/>
+              <a:lumOff val="60000"/>
+            </a:schemeClr>
+          </a:solidFill>
+        </p:spPr>
+        <p:style>
+          <a:lnRef idx="2">
+            <a:schemeClr val="accent1">
+              <a:shade val="50000"/>
+            </a:schemeClr>
+          </a:lnRef>
+          <a:fillRef idx="1">
+            <a:schemeClr val="accent1"/>
+          </a:fillRef>
+          <a:effectRef idx="0">
+            <a:schemeClr val="accent1"/>
+          </a:effectRef>
+          <a:fontRef idx="minor">
+            <a:schemeClr val="lt1"/>
+          </a:fontRef>
+        </p:style>
+        <p:txBody>
+          <a:bodyPr rtlCol="0" anchor="ctr"/>
+          <a:lstStyle/>
+          <a:p>
+            <a:pPr algn="ctr"/>
+            <a:endParaRPr lang="en-US"/>
+          </a:p>
+        </p:txBody>
+      </p:sp>
+    </p:spTree>
+    <p:extLst>
+      <p:ext uri="{BB962C8B-B14F-4D97-AF65-F5344CB8AC3E}">
+        <p14:creationId xmlns:p14="http://schemas.microsoft.com/office/powerpoint/2010/main" val="40371835"/>
+      </p:ext>
+    </p:extLst>
+  </p:cSld>
+  <p:clrMapOvr>
+    <a:masterClrMapping/>
+  </p:clrMapOvr>
+</p:sld>
+</file>
+
+<file path=ppt/slides/slide3.xml><?xml version="1.0" encoding="utf-8"?>
+<p:sld xmlns:a="http://schemas.openxmlformats.org/drawingml/2006/main" xmlns:r="http://schemas.openxmlformats.org/officeDocument/2006/relationships" xmlns:p="http://schemas.openxmlformats.org/presentationml/2006/main">
+  <p:cSld>
+    <p:spTree>
+      <p:nvGrpSpPr>
+        <p:cNvPr id="1" name=""/>
+        <p:cNvGrpSpPr/>
+        <p:nvPr/>
+      </p:nvGrpSpPr>
+      <p:grpSpPr>
+        <a:xfrm>
+          <a:off x="0" y="0"/>
+          <a:ext cx="0" cy="0"/>
+          <a:chOff x="0" y="0"/>
+          <a:chExt cx="0" cy="0"/>
+        </a:xfrm>
+      </p:grpSpPr>
+      <p:sp>
+        <p:nvSpPr>
+          <p:cNvPr id="2" name="Title 1"/>
+          <p:cNvSpPr>
+            <a:spLocks noGrp="1"/>
+          </p:cNvSpPr>
+          <p:nvPr>
+            <p:ph type="title"/>
+          </p:nvPr>
+        </p:nvSpPr>
+        <p:spPr/>
+        <p:txBody>
+          <a:bodyPr/>
+          <a:lstStyle/>
+          <a:p>
+            <a:r>
+              <a:rPr lang="en-US" dirty="0"/>
+              <a:t>Outline</a:t>
+            </a:r>
+          </a:p>
+        </p:txBody>
+      </p:sp>
+      <p:sp>
+        <p:nvSpPr>
+          <p:cNvPr id="3" name="Content Placeholder 2"/>
+          <p:cNvSpPr>
+            <a:spLocks noGrp="1"/>
+          </p:cNvSpPr>
+          <p:nvPr>
+            <p:ph idx="1"/>
+          </p:nvPr>
+        </p:nvSpPr>
+        <p:spPr/>
+        <p:txBody>
+          <a:bodyPr/>
+          <a:lstStyle/>
+          <a:p>
+            <a:r>
+              <a:rPr lang="en-US" dirty="0"/>
+              <a:t>Motivating Example:  Predicting the mpg of a car</a:t>
+            </a:r>
+          </a:p>
+          <a:p>
+            <a:r>
+              <a:rPr lang="en-US" dirty="0"/>
+              <a:t>Linear Model</a:t>
+            </a:r>
+          </a:p>
+          <a:p>
+            <a:r>
+              <a:rPr lang="en-US" dirty="0"/>
+              <a:t>Least Squares Fit Problem</a:t>
+            </a:r>
+          </a:p>
+          <a:p>
+            <a:r>
+              <a:rPr lang="en-US" dirty="0"/>
+              <a:t>Sample Mean and Variance</a:t>
+            </a:r>
+          </a:p>
+          <a:p>
+            <a:r>
+              <a:rPr lang="en-US" dirty="0"/>
+              <a:t>LS Fit Solution</a:t>
+            </a:r>
+          </a:p>
+          <a:p>
+            <a:r>
+              <a:rPr lang="en-US" dirty="0"/>
+              <a:t>Assessing Goodness of Fit</a:t>
+            </a:r>
+          </a:p>
+        </p:txBody>
+      </p:sp>
+      <p:sp>
+        <p:nvSpPr>
+          <p:cNvPr id="4" name="Slide Number Placeholder 3"/>
+          <p:cNvSpPr>
+            <a:spLocks noGrp="1"/>
+          </p:cNvSpPr>
+          <p:nvPr>
+            <p:ph type="sldNum" sz="quarter" idx="12"/>
+          </p:nvPr>
+        </p:nvSpPr>
+        <p:spPr/>
+        <p:txBody>
+          <a:bodyPr/>
+          <a:lstStyle/>
+          <a:p>
+            <a:fld id="{629637A9-119A-49DA-BD12-AAC58B377D80}" type="slidenum">
+              <a:rPr lang="en-US" smtClean="0"/>
+              <a:t>3</a:t>
+            </a:fld>
+            <a:endParaRPr lang="en-US" dirty="0"/>
+          </a:p>
+        </p:txBody>
+      </p:sp>
+      <p:sp>
+        <p:nvSpPr>
+          <p:cNvPr id="5" name="Arrow: Right 4"/>
+          <p:cNvSpPr/>
+          <p:nvPr/>
+        </p:nvSpPr>
+        <p:spPr>
+          <a:xfrm>
+            <a:off x="326498" y="1449124"/>
+            <a:ext cx="938784" cy="484632"/>
+          </a:xfrm>
+          <a:prstGeom prst="rightArrow">
+            <a:avLst/>
+          </a:prstGeom>
+          <a:solidFill>
+            <a:schemeClr val="accent1">
+              <a:lumMod val="40000"/>
+              <a:lumOff val="60000"/>
+            </a:schemeClr>
+          </a:solidFill>
+        </p:spPr>
+        <p:style>
+          <a:lnRef idx="2">
+            <a:schemeClr val="accent1">
+              <a:shade val="50000"/>
+            </a:schemeClr>
+          </a:lnRef>
+          <a:fillRef idx="1">
+            <a:schemeClr val="accent1"/>
+          </a:fillRef>
+          <a:effectRef idx="0">
+            <a:schemeClr val="accent1"/>
+          </a:effectRef>
+          <a:fontRef idx="minor">
+            <a:schemeClr val="lt1"/>
+          </a:fontRef>
+        </p:style>
+        <p:txBody>
+          <a:bodyPr rtlCol="0" anchor="ctr"/>
+          <a:lstStyle/>
+          <a:p>
+            <a:pPr algn="ctr"/>
+            <a:endParaRPr lang="en-US"/>
+          </a:p>
+        </p:txBody>
+      </p:sp>
+    </p:spTree>
+    <p:extLst>
+      <p:ext uri="{BB962C8B-B14F-4D97-AF65-F5344CB8AC3E}">
+        <p14:creationId xmlns:p14="http://schemas.microsoft.com/office/powerpoint/2010/main" val="2695907019"/>
+      </p:ext>
+    </p:extLst>
+  </p:cSld>
+  <p:clrMapOvr>
+    <a:masterClrMapping/>
+  </p:clrMapOvr>
+</p:sld>
+</file>
+
+<file path=ppt/slides/slide30.xml><?xml version="1.0" encoding="utf-8"?>
 <p:sld xmlns:a="http://schemas.openxmlformats.org/drawingml/2006/main" xmlns:r="http://schemas.openxmlformats.org/officeDocument/2006/relationships" xmlns:p="http://schemas.openxmlformats.org/presentationml/2006/main">
   <p:cSld>
     <p:spTree>
@@ -17756,7 +20162,7 @@
           <a:p>
             <a:fld id="{629637A9-119A-49DA-BD12-AAC58B377D80}" type="slidenum">
               <a:rPr lang="en-US" smtClean="0"/>
-              <a:t>28</a:t>
+              <a:t>30</a:t>
             </a:fld>
             <a:endParaRPr lang="en-US" dirty="0"/>
           </a:p>
@@ -17775,7 +20181,7 @@
 </p:sld>
 </file>
 
-<file path=ppt/slides/slide29.xml><?xml version="1.0" encoding="utf-8"?>
+<file path=ppt/slides/slide31.xml><?xml version="1.0" encoding="utf-8"?>
 <p:sld xmlns:a="http://schemas.openxmlformats.org/drawingml/2006/main" xmlns:r="http://schemas.openxmlformats.org/officeDocument/2006/relationships" xmlns:p="http://schemas.openxmlformats.org/presentationml/2006/main">
   <p:cSld>
     <p:spTree>
@@ -17890,7 +20296,7 @@
           <a:p>
             <a:fld id="{629637A9-119A-49DA-BD12-AAC58B377D80}" type="slidenum">
               <a:rPr lang="en-US" smtClean="0"/>
-              <a:t>29</a:t>
+              <a:t>31</a:t>
             </a:fld>
             <a:endParaRPr lang="en-US" dirty="0"/>
           </a:p>
@@ -17933,174 +20339,7 @@
 </p:sld>
 </file>
 
-<file path=ppt/slides/slide3.xml><?xml version="1.0" encoding="utf-8"?>
-<p:sld xmlns:a="http://schemas.openxmlformats.org/drawingml/2006/main" xmlns:r="http://schemas.openxmlformats.org/officeDocument/2006/relationships" xmlns:p="http://schemas.openxmlformats.org/presentationml/2006/main">
-  <p:cSld>
-    <p:spTree>
-      <p:nvGrpSpPr>
-        <p:cNvPr id="1" name=""/>
-        <p:cNvGrpSpPr/>
-        <p:nvPr/>
-      </p:nvGrpSpPr>
-      <p:grpSpPr>
-        <a:xfrm>
-          <a:off x="0" y="0"/>
-          <a:ext cx="0" cy="0"/>
-          <a:chOff x="0" y="0"/>
-          <a:chExt cx="0" cy="0"/>
-        </a:xfrm>
-      </p:grpSpPr>
-      <p:sp>
-        <p:nvSpPr>
-          <p:cNvPr id="2" name="Title 1"/>
-          <p:cNvSpPr>
-            <a:spLocks noGrp="1"/>
-          </p:cNvSpPr>
-          <p:nvPr>
-            <p:ph type="title"/>
-          </p:nvPr>
-        </p:nvSpPr>
-        <p:spPr/>
-        <p:txBody>
-          <a:bodyPr/>
-          <a:lstStyle/>
-          <a:p>
-            <a:r>
-              <a:rPr lang="en-US" dirty="0"/>
-              <a:t>Outline</a:t>
-            </a:r>
-          </a:p>
-        </p:txBody>
-      </p:sp>
-      <p:sp>
-        <p:nvSpPr>
-          <p:cNvPr id="3" name="Content Placeholder 2"/>
-          <p:cNvSpPr>
-            <a:spLocks noGrp="1"/>
-          </p:cNvSpPr>
-          <p:nvPr>
-            <p:ph idx="1"/>
-          </p:nvPr>
-        </p:nvSpPr>
-        <p:spPr/>
-        <p:txBody>
-          <a:bodyPr/>
-          <a:lstStyle/>
-          <a:p>
-            <a:r>
-              <a:rPr lang="en-US" dirty="0"/>
-              <a:t>Motivating Example:  Predicting the mpg of a car</a:t>
-            </a:r>
-          </a:p>
-          <a:p>
-            <a:r>
-              <a:rPr lang="en-US" dirty="0"/>
-              <a:t>Linear Model</a:t>
-            </a:r>
-          </a:p>
-          <a:p>
-            <a:r>
-              <a:rPr lang="en-US" dirty="0"/>
-              <a:t>Least Squares Fit Problem</a:t>
-            </a:r>
-          </a:p>
-          <a:p>
-            <a:r>
-              <a:rPr lang="en-US" dirty="0"/>
-              <a:t>Sample Mean and Variance; LS Fit Solution</a:t>
-            </a:r>
-          </a:p>
-          <a:p>
-            <a:r>
-              <a:rPr lang="en-US" dirty="0"/>
-              <a:t>Assessing Goodness of Fit</a:t>
-            </a:r>
-          </a:p>
-        </p:txBody>
-      </p:sp>
-      <p:sp>
-        <p:nvSpPr>
-          <p:cNvPr id="4" name="Slide Number Placeholder 3"/>
-          <p:cNvSpPr>
-            <a:spLocks noGrp="1"/>
-          </p:cNvSpPr>
-          <p:nvPr>
-            <p:ph type="sldNum" sz="quarter" idx="12"/>
-          </p:nvPr>
-        </p:nvSpPr>
-        <p:spPr/>
-        <p:txBody>
-          <a:bodyPr/>
-          <a:lstStyle/>
-          <a:p>
-            <a:fld id="{629637A9-119A-49DA-BD12-AAC58B377D80}" type="slidenum">
-              <a:rPr lang="en-US" smtClean="0"/>
-              <a:t>3</a:t>
-            </a:fld>
-            <a:endParaRPr lang="en-US" dirty="0"/>
-          </a:p>
-        </p:txBody>
-      </p:sp>
-      <p:sp>
-        <p:nvSpPr>
-          <p:cNvPr id="5" name="Arrow: Right 4"/>
-          <p:cNvSpPr/>
-          <p:nvPr/>
-        </p:nvSpPr>
-        <p:spPr>
-          <a:xfrm>
-            <a:off x="303250" y="1430906"/>
-            <a:ext cx="938784" cy="484632"/>
-          </a:xfrm>
-          <a:prstGeom prst="rightArrow">
-            <a:avLst/>
-          </a:prstGeom>
-          <a:solidFill>
-            <a:schemeClr val="accent1">
-              <a:lumMod val="40000"/>
-              <a:lumOff val="60000"/>
-            </a:schemeClr>
-          </a:solidFill>
-        </p:spPr>
-        <p:style>
-          <a:lnRef idx="2">
-            <a:schemeClr val="accent1">
-              <a:shade val="50000"/>
-            </a:schemeClr>
-          </a:lnRef>
-          <a:fillRef idx="1">
-            <a:schemeClr val="accent1"/>
-          </a:fillRef>
-          <a:effectRef idx="0">
-            <a:schemeClr val="accent1"/>
-          </a:effectRef>
-          <a:fontRef idx="minor">
-            <a:schemeClr val="lt1"/>
-          </a:fontRef>
-        </p:style>
-        <p:txBody>
-          <a:bodyPr rtlCol="0" anchor="ctr"/>
-          <a:lstStyle/>
-          <a:p>
-            <a:pPr algn="ctr"/>
-            <a:endParaRPr lang="en-US"/>
-          </a:p>
-        </p:txBody>
-      </p:sp>
-    </p:spTree>
-    <p:extLst>
-      <p:ext uri="{BB962C8B-B14F-4D97-AF65-F5344CB8AC3E}">
-        <p14:creationId xmlns:p14="http://schemas.microsoft.com/office/powerpoint/2010/main" val="2110066861"/>
-      </p:ext>
-    </p:extLst>
-  </p:cSld>
-  <p:clrMapOvr>
-    <a:masterClrMapping/>
-  </p:clrMapOvr>
-</p:sld>
-</file>
-
-<file path=ppt/slides/slide30.xml><?xml version="1.0" encoding="utf-8"?>
+<file path=ppt/slides/slide32.xml><?xml version="1.0" encoding="utf-8"?>
 <p:sld xmlns:a="http://schemas.openxmlformats.org/drawingml/2006/main" xmlns:r="http://schemas.openxmlformats.org/officeDocument/2006/relationships" xmlns:p="http://schemas.openxmlformats.org/presentationml/2006/main">
   <p:cSld>
     <p:spTree>
@@ -18201,7 +20440,7 @@
           <a:p>
             <a:fld id="{629637A9-119A-49DA-BD12-AAC58B377D80}" type="slidenum">
               <a:rPr lang="en-US" smtClean="0"/>
-              <a:t>30</a:t>
+              <a:t>32</a:t>
             </a:fld>
             <a:endParaRPr lang="en-US" dirty="0"/>
           </a:p>
@@ -18585,7 +20824,7 @@
 </p:sld>
 </file>
 
-<file path=ppt/slides/slide31.xml><?xml version="1.0" encoding="utf-8"?>
+<file path=ppt/slides/slide33.xml><?xml version="1.0" encoding="utf-8"?>
 <p:sld xmlns:a="http://schemas.openxmlformats.org/drawingml/2006/main" xmlns:r="http://schemas.openxmlformats.org/officeDocument/2006/relationships" xmlns:p="http://schemas.openxmlformats.org/presentationml/2006/main">
   <p:cSld>
     <p:spTree>
@@ -18659,7 +20898,13 @@
           <a:p>
             <a:r>
               <a:rPr lang="en-US" dirty="0"/>
-              <a:t>Sample Mean and Variance; LS Fit Solution</a:t>
+              <a:t>Sample Mean and Variance</a:t>
+            </a:r>
+          </a:p>
+          <a:p>
+            <a:r>
+              <a:rPr lang="en-US" dirty="0"/>
+              <a:t>LS Fit Solution</a:t>
             </a:r>
           </a:p>
           <a:p>
@@ -18687,7 +20932,7 @@
           <a:p>
             <a:fld id="{629637A9-119A-49DA-BD12-AAC58B377D80}" type="slidenum">
               <a:rPr lang="en-US" smtClean="0"/>
-              <a:t>31</a:t>
+              <a:t>33</a:t>
             </a:fld>
             <a:endParaRPr lang="en-US" dirty="0"/>
           </a:p>
@@ -18701,7 +20946,7 @@
         </p:nvSpPr>
         <p:spPr>
           <a:xfrm>
-            <a:off x="326497" y="3275206"/>
+            <a:off x="390891" y="3704185"/>
             <a:ext cx="938784" cy="484632"/>
           </a:xfrm>
           <a:prstGeom prst="rightArrow">
@@ -18742,7 +20987,7 @@
     </p:spTree>
     <p:extLst>
       <p:ext uri="{BB962C8B-B14F-4D97-AF65-F5344CB8AC3E}">
-        <p14:creationId xmlns:p14="http://schemas.microsoft.com/office/powerpoint/2010/main" val="1240598927"/>
+        <p14:creationId xmlns:p14="http://schemas.microsoft.com/office/powerpoint/2010/main" val="548470963"/>
       </p:ext>
     </p:extLst>
   </p:cSld>
@@ -18752,7 +20997,7 @@
 </p:sld>
 </file>
 
-<file path=ppt/slides/slide32.xml><?xml version="1.0" encoding="utf-8"?>
+<file path=ppt/slides/slide34.xml><?xml version="1.0" encoding="utf-8"?>
 <p:sld xmlns:a="http://schemas.openxmlformats.org/drawingml/2006/main" xmlns:r="http://schemas.openxmlformats.org/officeDocument/2006/relationships" xmlns:p="http://schemas.openxmlformats.org/presentationml/2006/main">
   <p:cSld>
     <p:spTree>
@@ -19425,7 +21670,7 @@
           <a:p>
             <a:fld id="{629637A9-119A-49DA-BD12-AAC58B377D80}" type="slidenum">
               <a:rPr lang="en-US" smtClean="0"/>
-              <a:t>32</a:t>
+              <a:t>34</a:t>
             </a:fld>
             <a:endParaRPr lang="en-US" dirty="0"/>
           </a:p>
@@ -19485,7 +21730,7 @@
 </p:sld>
 </file>
 
-<file path=ppt/slides/slide33.xml><?xml version="1.0" encoding="utf-8"?>
+<file path=ppt/slides/slide35.xml><?xml version="1.0" encoding="utf-8"?>
 <p:sld xmlns:a="http://schemas.openxmlformats.org/drawingml/2006/main" xmlns:r="http://schemas.openxmlformats.org/officeDocument/2006/relationships" xmlns:p="http://schemas.openxmlformats.org/presentationml/2006/main">
   <p:cSld>
     <p:spTree>
@@ -19981,7 +22226,7 @@
           <a:p>
             <a:fld id="{629637A9-119A-49DA-BD12-AAC58B377D80}" type="slidenum">
               <a:rPr lang="en-US" smtClean="0"/>
-              <a:t>33</a:t>
+              <a:t>35</a:t>
             </a:fld>
             <a:endParaRPr lang="en-US" dirty="0"/>
           </a:p>
@@ -20308,7 +22553,7 @@
 </p:sld>
 </file>
 
-<file path=ppt/slides/slide34.xml><?xml version="1.0" encoding="utf-8"?>
+<file path=ppt/slides/slide36.xml><?xml version="1.0" encoding="utf-8"?>
 <p:sld xmlns:a="http://schemas.openxmlformats.org/drawingml/2006/main" xmlns:r="http://schemas.openxmlformats.org/officeDocument/2006/relationships" xmlns:p="http://schemas.openxmlformats.org/presentationml/2006/main">
   <p:cSld>
     <p:spTree>
@@ -20436,7 +22681,7 @@
           <a:p>
             <a:fld id="{629637A9-119A-49DA-BD12-AAC58B377D80}" type="slidenum">
               <a:rPr lang="en-US" smtClean="0"/>
-              <a:t>34</a:t>
+              <a:t>36</a:t>
             </a:fld>
             <a:endParaRPr lang="en-US" dirty="0"/>
           </a:p>
@@ -20496,7 +22741,7 @@
 </p:sld>
 </file>
 
-<file path=ppt/slides/slide35.xml><?xml version="1.0" encoding="utf-8"?>
+<file path=ppt/slides/slide37.xml><?xml version="1.0" encoding="utf-8"?>
 <p:sld xmlns:a="http://schemas.openxmlformats.org/drawingml/2006/main" xmlns:r="http://schemas.openxmlformats.org/officeDocument/2006/relationships" xmlns:p="http://schemas.openxmlformats.org/presentationml/2006/main">
   <p:cSld>
     <p:spTree>
@@ -20760,7 +23005,7 @@
           <a:p>
             <a:fld id="{629637A9-119A-49DA-BD12-AAC58B377D80}" type="slidenum">
               <a:rPr lang="en-US" smtClean="0"/>
-              <a:t>35</a:t>
+              <a:t>37</a:t>
             </a:fld>
             <a:endParaRPr lang="en-US" dirty="0"/>
           </a:p>

</xml_diff>